<commit_message>
added suggestions from Eric
</commit_message>
<xml_diff>
--- a/docs/GitHub Workflow for SAP.pptx
+++ b/docs/GitHub Workflow for SAP.pptx
@@ -216,7 +216,7 @@
           <a:p>
             <a:fld id="{725B3EBC-B880-4A78-B8E5-BB9890C31678}" type="datetimeFigureOut">
               <a:rPr lang="en-US" smtClean="0"/>
-              <a:t>3/24/2022</a:t>
+              <a:t>4/5/2022</a:t>
             </a:fld>
             <a:endParaRPr lang="en-US"/>
           </a:p>
@@ -381,7 +381,7 @@
           <a:p>
             <a:fld id="{17565DFC-8168-4DE6-BB56-8CCE757EF166}" type="datetimeFigureOut">
               <a:rPr lang="en-US" smtClean="0"/>
-              <a:t>3/24/2022</a:t>
+              <a:t>4/5/2022</a:t>
             </a:fld>
             <a:endParaRPr lang="en-US"/>
           </a:p>
@@ -694,36 +694,25 @@
           <a:lstStyle/>
           <a:p>
             <a:r>
-              <a:rPr lang="en-US" sz="1600" dirty="0" smtClean="0"/>
-              <a:t>Common files for a new repo</a:t>
-            </a:r>
-          </a:p>
-          <a:p>
-            <a:pPr lvl="1"/>
-            <a:r>
-              <a:rPr lang="en-US" sz="1400" dirty="0" smtClean="0"/>
-              <a:t>README.md (in markdown language, used to provide info about the repo: who, what, why, how)</a:t>
-            </a:r>
-          </a:p>
-          <a:p>
-            <a:pPr lvl="1"/>
-            <a:r>
-              <a:rPr lang="en-US" sz="1400" dirty="0" err="1" smtClean="0"/>
-              <a:t>Gitignore</a:t>
-            </a:r>
-            <a:r>
-              <a:rPr lang="en-US" sz="1400" dirty="0" smtClean="0"/>
-              <a:t> (files to not be included in the repo, can be specific files or directories or files with a specific naming (i.e. .csv)</a:t>
-            </a:r>
-          </a:p>
-          <a:p>
-            <a:pPr lvl="1"/>
-            <a:r>
-              <a:rPr lang="en-US" sz="1400" dirty="0" smtClean="0"/>
-              <a:t>License.md (legal license for the repo, especially important for packages)</a:t>
-            </a:r>
-          </a:p>
-          <a:p>
+              <a:rPr lang="en-US" dirty="0" err="1" smtClean="0"/>
+              <a:t>Git</a:t>
+            </a:r>
+            <a:r>
+              <a:rPr lang="en-US" dirty="0" smtClean="0"/>
+              <a:t> is version</a:t>
+            </a:r>
+            <a:r>
+              <a:rPr lang="en-US" baseline="0" dirty="0" smtClean="0"/>
+              <a:t> control software, </a:t>
+            </a:r>
+            <a:r>
+              <a:rPr lang="en-US" baseline="0" dirty="0" err="1" smtClean="0"/>
+              <a:t>github</a:t>
+            </a:r>
+            <a:r>
+              <a:rPr lang="en-US" baseline="0" dirty="0" smtClean="0"/>
+              <a:t> is service</a:t>
+            </a:r>
             <a:endParaRPr lang="en-US" dirty="0"/>
           </a:p>
         </p:txBody>
@@ -745,7 +734,7 @@
           <a:p>
             <a:fld id="{F6075E4F-4EE8-4477-BD93-32977E8FFBBF}" type="slidenum">
               <a:rPr lang="en-US" smtClean="0"/>
-              <a:t>5</a:t>
+              <a:t>3</a:t>
             </a:fld>
             <a:endParaRPr lang="en-US"/>
           </a:p>
@@ -754,7 +743,145 @@
     </p:spTree>
     <p:extLst>
       <p:ext uri="{BB962C8B-B14F-4D97-AF65-F5344CB8AC3E}">
-        <p14:creationId xmlns:p14="http://schemas.microsoft.com/office/powerpoint/2010/main" val="532362781"/>
+        <p14:creationId xmlns:p14="http://schemas.microsoft.com/office/powerpoint/2010/main" val="514629266"/>
+      </p:ext>
+    </p:extLst>
+  </p:cSld>
+  <p:clrMapOvr>
+    <a:masterClrMapping/>
+  </p:clrMapOvr>
+</p:notes>
+</file>
+
+<file path=ppt/notesSlides/notesSlide10.xml><?xml version="1.0" encoding="utf-8"?>
+<p:notes xmlns:a="http://schemas.openxmlformats.org/drawingml/2006/main" xmlns:r="http://schemas.openxmlformats.org/officeDocument/2006/relationships" xmlns:p="http://schemas.openxmlformats.org/presentationml/2006/main">
+  <p:cSld>
+    <p:spTree>
+      <p:nvGrpSpPr>
+        <p:cNvPr id="1" name=""/>
+        <p:cNvGrpSpPr/>
+        <p:nvPr/>
+      </p:nvGrpSpPr>
+      <p:grpSpPr>
+        <a:xfrm>
+          <a:off x="0" y="0"/>
+          <a:ext cx="0" cy="0"/>
+          <a:chOff x="0" y="0"/>
+          <a:chExt cx="0" cy="0"/>
+        </a:xfrm>
+      </p:grpSpPr>
+      <p:sp>
+        <p:nvSpPr>
+          <p:cNvPr id="2" name="Slide Image Placeholder 1"/>
+          <p:cNvSpPr>
+            <a:spLocks noGrp="1" noRot="1" noChangeAspect="1"/>
+          </p:cNvSpPr>
+          <p:nvPr>
+            <p:ph type="sldImg"/>
+          </p:nvPr>
+        </p:nvSpPr>
+        <p:spPr/>
+      </p:sp>
+      <p:sp>
+        <p:nvSpPr>
+          <p:cNvPr id="3" name="Notes Placeholder 2"/>
+          <p:cNvSpPr>
+            <a:spLocks noGrp="1"/>
+          </p:cNvSpPr>
+          <p:nvPr>
+            <p:ph type="body" idx="1"/>
+          </p:nvPr>
+        </p:nvSpPr>
+        <p:spPr/>
+        <p:txBody>
+          <a:bodyPr/>
+          <a:lstStyle/>
+          <a:p>
+            <a:r>
+              <a:rPr lang="en-US" dirty="0" smtClean="0"/>
+              <a:t>Create a separate folder that only contains confidential data and add this folder to the </a:t>
+            </a:r>
+            <a:r>
+              <a:rPr lang="en-US" dirty="0" err="1" smtClean="0"/>
+              <a:t>gitignore</a:t>
+            </a:r>
+            <a:r>
+              <a:rPr lang="en-US" dirty="0" smtClean="0"/>
+              <a:t> file.</a:t>
+            </a:r>
+          </a:p>
+          <a:p>
+            <a:r>
+              <a:rPr lang="en-US" dirty="0" smtClean="0"/>
+              <a:t>Use a common filename structure (i.e. *_CON.csv) for all files that are confidential. This allows you to add that file name to the </a:t>
+            </a:r>
+            <a:r>
+              <a:rPr lang="en-US" dirty="0" err="1" smtClean="0"/>
+              <a:t>gitignore</a:t>
+            </a:r>
+            <a:r>
+              <a:rPr lang="en-US" dirty="0" smtClean="0"/>
+              <a:t> file, creating a second check that it will not be pushed to the repository as well as helping to identify that data set as confidential to other collaborators.</a:t>
+            </a:r>
+          </a:p>
+          <a:p>
+            <a:r>
+              <a:rPr lang="en-US" dirty="0" smtClean="0"/>
+              <a:t>Use R packages such as keyring to store credentials such as username and passwords that you do not want to write out in your code</a:t>
+            </a:r>
+          </a:p>
+          <a:p>
+            <a:r>
+              <a:rPr lang="en-US" dirty="0" smtClean="0"/>
+              <a:t>Use R packages such as </a:t>
+            </a:r>
+            <a:r>
+              <a:rPr lang="en-US" dirty="0" err="1" smtClean="0"/>
+              <a:t>dotenv</a:t>
+            </a:r>
+            <a:r>
+              <a:rPr lang="en-US" dirty="0" smtClean="0"/>
+              <a:t> to create variables for your environment that hides the name or link to confidential data</a:t>
+            </a:r>
+          </a:p>
+          <a:p>
+            <a:r>
+              <a:rPr lang="en-US" dirty="0" smtClean="0"/>
+              <a:t>Remember, the data is confidential but what you do to the data is not, so keep the initial prep script short and create a non-confidential version of the dataset that can be shared on the repo</a:t>
+            </a:r>
+          </a:p>
+          <a:p>
+            <a:endParaRPr lang="en-US" dirty="0"/>
+          </a:p>
+        </p:txBody>
+      </p:sp>
+      <p:sp>
+        <p:nvSpPr>
+          <p:cNvPr id="4" name="Slide Number Placeholder 3"/>
+          <p:cNvSpPr>
+            <a:spLocks noGrp="1"/>
+          </p:cNvSpPr>
+          <p:nvPr>
+            <p:ph type="sldNum" sz="quarter" idx="10"/>
+          </p:nvPr>
+        </p:nvSpPr>
+        <p:spPr/>
+        <p:txBody>
+          <a:bodyPr/>
+          <a:lstStyle/>
+          <a:p>
+            <a:fld id="{F6075E4F-4EE8-4477-BD93-32977E8FFBBF}" type="slidenum">
+              <a:rPr lang="en-US" smtClean="0"/>
+              <a:t>12</a:t>
+            </a:fld>
+            <a:endParaRPr lang="en-US"/>
+          </a:p>
+        </p:txBody>
+      </p:sp>
+    </p:spTree>
+    <p:extLst>
+      <p:ext uri="{BB962C8B-B14F-4D97-AF65-F5344CB8AC3E}">
+        <p14:creationId xmlns:p14="http://schemas.microsoft.com/office/powerpoint/2010/main" val="1646083546"/>
       </p:ext>
     </p:extLst>
   </p:cSld>
@@ -808,7 +935,15 @@
           <a:bodyPr/>
           <a:lstStyle/>
           <a:p>
-            <a:endParaRPr lang="en-US" dirty="0"/>
+            <a:r>
+              <a:rPr lang="en-US" dirty="0" smtClean="0"/>
+              <a:t>Push and pull</a:t>
+            </a:r>
+            <a:r>
+              <a:rPr lang="en-US" baseline="0" dirty="0" smtClean="0"/>
+              <a:t> from local computer to server - add</a:t>
+            </a:r>
+            <a:endParaRPr lang="en-US" dirty="0" smtClean="0"/>
           </a:p>
         </p:txBody>
       </p:sp>
@@ -829,7 +964,7 @@
           <a:p>
             <a:fld id="{F6075E4F-4EE8-4477-BD93-32977E8FFBBF}" type="slidenum">
               <a:rPr lang="en-US" smtClean="0"/>
-              <a:t>6</a:t>
+              <a:t>4</a:t>
             </a:fld>
             <a:endParaRPr lang="en-US"/>
           </a:p>
@@ -838,7 +973,7 @@
     </p:spTree>
     <p:extLst>
       <p:ext uri="{BB962C8B-B14F-4D97-AF65-F5344CB8AC3E}">
-        <p14:creationId xmlns:p14="http://schemas.microsoft.com/office/powerpoint/2010/main" val="2990830688"/>
+        <p14:creationId xmlns:p14="http://schemas.microsoft.com/office/powerpoint/2010/main" val="4220040141"/>
       </p:ext>
     </p:extLst>
   </p:cSld>
@@ -893,42 +1028,43 @@
           <a:lstStyle/>
           <a:p>
             <a:r>
-              <a:rPr lang="en-US" dirty="0" smtClean="0"/>
-              <a:t>Commit change and add commit message</a:t>
+              <a:rPr lang="en-US" sz="1600" dirty="0" smtClean="0"/>
+              <a:t>Common files for a new repo</a:t>
             </a:r>
           </a:p>
           <a:p>
             <a:pPr lvl="1"/>
             <a:r>
-              <a:rPr lang="en-US" dirty="0" smtClean="0"/>
-              <a:t>Short but descriptive</a:t>
-            </a:r>
-          </a:p>
-          <a:p>
-            <a:r>
-              <a:rPr lang="en-US" dirty="0" smtClean="0"/>
-              <a:t>Push changes to repository</a:t>
+              <a:rPr lang="en-US" sz="1400" dirty="0" smtClean="0"/>
+              <a:t>README.md (in markdown language, used to provide info about the repo: who, what, why, how)</a:t>
             </a:r>
           </a:p>
           <a:p>
             <a:pPr lvl="1"/>
             <a:r>
-              <a:rPr lang="en-US" dirty="0" smtClean="0"/>
-              <a:t>Choose which branch to push to</a:t>
+              <a:rPr lang="en-US" sz="1400" dirty="0" err="1" smtClean="0"/>
+              <a:t>Gitignore</a:t>
+            </a:r>
+            <a:r>
+              <a:rPr lang="en-US" sz="1400" dirty="0" smtClean="0"/>
+              <a:t> (files to not be included in the repo, can be specific files or directories or files with a specific naming (i.e. .csv)</a:t>
             </a:r>
           </a:p>
           <a:p>
             <a:pPr lvl="1"/>
             <a:r>
-              <a:rPr lang="en-US" dirty="0" smtClean="0"/>
-              <a:t>Can push multiple commits at once</a:t>
-            </a:r>
-          </a:p>
-          <a:p>
-            <a:r>
-              <a:rPr lang="en-US" dirty="0" smtClean="0"/>
-              <a:t>Pull before starting a new session to make sure you have the most updated version</a:t>
-            </a:r>
+              <a:rPr lang="en-US" sz="1400" dirty="0" smtClean="0"/>
+              <a:t>License.md (legal license for the repo, especially important for packages</a:t>
+            </a:r>
+            <a:r>
+              <a:rPr lang="en-US" sz="1400" dirty="0" smtClean="0"/>
+              <a:t>) – make it</a:t>
+            </a:r>
+            <a:r>
+              <a:rPr lang="en-US" sz="1400" baseline="0" dirty="0" smtClean="0"/>
+              <a:t> a MIT license</a:t>
+            </a:r>
+            <a:endParaRPr lang="en-US" sz="1400" dirty="0" smtClean="0"/>
           </a:p>
           <a:p>
             <a:endParaRPr lang="en-US" dirty="0"/>
@@ -952,7 +1088,7 @@
           <a:p>
             <a:fld id="{F6075E4F-4EE8-4477-BD93-32977E8FFBBF}" type="slidenum">
               <a:rPr lang="en-US" smtClean="0"/>
-              <a:t>7</a:t>
+              <a:t>5</a:t>
             </a:fld>
             <a:endParaRPr lang="en-US"/>
           </a:p>
@@ -961,7 +1097,7 @@
     </p:spTree>
     <p:extLst>
       <p:ext uri="{BB962C8B-B14F-4D97-AF65-F5344CB8AC3E}">
-        <p14:creationId xmlns:p14="http://schemas.microsoft.com/office/powerpoint/2010/main" val="2175215945"/>
+        <p14:creationId xmlns:p14="http://schemas.microsoft.com/office/powerpoint/2010/main" val="532362781"/>
       </p:ext>
     </p:extLst>
   </p:cSld>
@@ -1017,35 +1153,52 @@
           <a:p>
             <a:r>
               <a:rPr lang="en-US" dirty="0" smtClean="0"/>
-              <a:t>When working with others, use branches </a:t>
+              <a:t>#add </a:t>
+            </a:r>
+          </a:p>
+          <a:p>
+            <a:r>
+              <a:rPr lang="en-US" dirty="0" err="1" smtClean="0"/>
+              <a:t>Rstudio</a:t>
+            </a:r>
+            <a:r>
+              <a:rPr lang="en-US" baseline="0" dirty="0" smtClean="0"/>
+              <a:t> – new project – version control (assume </a:t>
+            </a:r>
+            <a:r>
+              <a:rPr lang="en-US" baseline="0" dirty="0" err="1" smtClean="0"/>
+              <a:t>git</a:t>
+            </a:r>
+            <a:r>
+              <a:rPr lang="en-US" baseline="0" dirty="0" smtClean="0"/>
+              <a:t> installed) – </a:t>
+            </a:r>
+            <a:r>
+              <a:rPr lang="en-US" baseline="0" dirty="0" err="1" smtClean="0"/>
+              <a:t>git</a:t>
+            </a:r>
+            <a:r>
+              <a:rPr lang="en-US" baseline="0" dirty="0" smtClean="0"/>
+              <a:t> – add info –create project</a:t>
             </a:r>
           </a:p>
           <a:p>
             <a:r>
               <a:rPr lang="en-US" dirty="0" smtClean="0"/>
-              <a:t>Branches allow someone to work on a section without affecting the main branch </a:t>
-            </a:r>
-          </a:p>
-          <a:p>
-            <a:r>
-              <a:rPr lang="en-US" dirty="0" smtClean="0"/>
-              <a:t>Create a new branch for each major step of development</a:t>
-            </a:r>
-          </a:p>
-          <a:p>
-            <a:pPr lvl="1"/>
-            <a:r>
-              <a:rPr lang="en-US" dirty="0" smtClean="0"/>
-              <a:t>Data prep, data analysis, model development, results </a:t>
-            </a:r>
-          </a:p>
-          <a:p>
-            <a:r>
-              <a:rPr lang="en-US" dirty="0" smtClean="0"/>
-              <a:t>Integrate branch changes with PRs to main branch</a:t>
-            </a:r>
-          </a:p>
-          <a:p>
+              <a:t>Commit</a:t>
+            </a:r>
+            <a:r>
+              <a:rPr lang="en-US" baseline="0" dirty="0" smtClean="0"/>
+              <a:t> – add commit message – push (green arrow, terminal </a:t>
+            </a:r>
+            <a:r>
+              <a:rPr lang="en-US" baseline="0" dirty="0" err="1" smtClean="0"/>
+              <a:t>git</a:t>
+            </a:r>
+            <a:r>
+              <a:rPr lang="en-US" baseline="0" dirty="0" smtClean="0"/>
+              <a:t> push master)</a:t>
+            </a:r>
             <a:endParaRPr lang="en-US" dirty="0"/>
           </a:p>
         </p:txBody>
@@ -1067,7 +1220,7 @@
           <a:p>
             <a:fld id="{F6075E4F-4EE8-4477-BD93-32977E8FFBBF}" type="slidenum">
               <a:rPr lang="en-US" smtClean="0"/>
-              <a:t>9</a:t>
+              <a:t>6</a:t>
             </a:fld>
             <a:endParaRPr lang="en-US"/>
           </a:p>
@@ -1076,7 +1229,7 @@
     </p:spTree>
     <p:extLst>
       <p:ext uri="{BB962C8B-B14F-4D97-AF65-F5344CB8AC3E}">
-        <p14:creationId xmlns:p14="http://schemas.microsoft.com/office/powerpoint/2010/main" val="304653265"/>
+        <p14:creationId xmlns:p14="http://schemas.microsoft.com/office/powerpoint/2010/main" val="2990830688"/>
       </p:ext>
     </p:extLst>
   </p:cSld>
@@ -1130,135 +1283,64 @@
           <a:bodyPr/>
           <a:lstStyle/>
           <a:p>
-            <a:pPr>
-              <a:lnSpc>
-                <a:spcPct val="100000"/>
-              </a:lnSpc>
-              <a:spcAft>
-                <a:spcPts val="1200"/>
-              </a:spcAft>
-            </a:pPr>
-            <a:r>
-              <a:rPr lang="en-US" dirty="0" smtClean="0">
-                <a:latin typeface="Red Hat Mono Light" panose="02010309040201060303" pitchFamily="49" charset="0"/>
+            <a:r>
+              <a:rPr lang="en-US" sz="1200" b="0" i="0" kern="1200" dirty="0" smtClean="0">
+                <a:solidFill>
+                  <a:schemeClr val="tx1"/>
+                </a:solidFill>
+                <a:effectLst/>
+                <a:latin typeface="+mn-lt"/>
+                <a:ea typeface="+mn-ea"/>
+                <a:cs typeface="+mn-cs"/>
               </a:rPr>
-              <a:t>Set up a GitHub Pages for the </a:t>
-            </a:r>
-            <a:r>
-              <a:rPr lang="en-US" dirty="0" smtClean="0">
-                <a:latin typeface="Red Hat Mono Light" panose="02010309040201060303" pitchFamily="49" charset="0"/>
-              </a:rPr>
-              <a:t>repo which is a website hosted by </a:t>
-            </a:r>
-            <a:r>
-              <a:rPr lang="en-US" dirty="0" err="1" smtClean="0">
-                <a:latin typeface="Red Hat Mono Light" panose="02010309040201060303" pitchFamily="49" charset="0"/>
-              </a:rPr>
-              <a:t>github</a:t>
-            </a:r>
-            <a:r>
-              <a:rPr lang="en-US" dirty="0" smtClean="0">
-                <a:latin typeface="Red Hat Mono Light" panose="02010309040201060303" pitchFamily="49" charset="0"/>
-              </a:rPr>
-              <a:t>.</a:t>
-            </a:r>
-            <a:r>
-              <a:rPr lang="en-US" baseline="0" dirty="0" smtClean="0">
-                <a:latin typeface="Red Hat Mono Light" panose="02010309040201060303" pitchFamily="49" charset="0"/>
-              </a:rPr>
-              <a:t> The benefit of this is that it a</a:t>
-            </a:r>
-            <a:r>
-              <a:rPr lang="en-US" dirty="0" smtClean="0">
-                <a:latin typeface="Red Hat Mono Light" panose="02010309040201060303" pitchFamily="49" charset="0"/>
-              </a:rPr>
-              <a:t>llows </a:t>
-            </a:r>
-            <a:r>
-              <a:rPr lang="en-US" dirty="0" smtClean="0">
-                <a:latin typeface="Red Hat Mono Light" panose="02010309040201060303" pitchFamily="49" charset="0"/>
-              </a:rPr>
-              <a:t>you to host </a:t>
-            </a:r>
-            <a:r>
-              <a:rPr lang="en-US" dirty="0" err="1" smtClean="0">
-                <a:latin typeface="Red Hat Mono Light" panose="02010309040201060303" pitchFamily="49" charset="0"/>
-              </a:rPr>
-              <a:t>htlm</a:t>
-            </a:r>
-            <a:r>
-              <a:rPr lang="en-US" dirty="0" smtClean="0">
-                <a:latin typeface="Red Hat Mono Light" panose="02010309040201060303" pitchFamily="49" charset="0"/>
-              </a:rPr>
-              <a:t> files </a:t>
-            </a:r>
-            <a:r>
-              <a:rPr lang="en-US" dirty="0" smtClean="0">
-                <a:latin typeface="Red Hat Mono Light" panose="02010309040201060303" pitchFamily="49" charset="0"/>
-              </a:rPr>
-              <a:t>s</a:t>
-            </a:r>
-            <a:r>
-              <a:rPr lang="en-US" baseline="0" dirty="0" smtClean="0">
-                <a:latin typeface="Red Hat Mono Light" panose="02010309040201060303" pitchFamily="49" charset="0"/>
-              </a:rPr>
-              <a:t>o you </a:t>
-            </a:r>
-            <a:r>
-              <a:rPr lang="en-US" dirty="0" smtClean="0">
-                <a:latin typeface="Red Hat Mono Light" panose="02010309040201060303" pitchFamily="49" charset="0"/>
-              </a:rPr>
-              <a:t>can </a:t>
-            </a:r>
-            <a:r>
-              <a:rPr lang="en-US" dirty="0" smtClean="0">
-                <a:latin typeface="Red Hat Mono Light" panose="02010309040201060303" pitchFamily="49" charset="0"/>
-              </a:rPr>
-              <a:t>view .</a:t>
-            </a:r>
-            <a:r>
-              <a:rPr lang="en-US" dirty="0" err="1" smtClean="0">
-                <a:latin typeface="Red Hat Mono Light" panose="02010309040201060303" pitchFamily="49" charset="0"/>
-              </a:rPr>
-              <a:t>Rmarkdown</a:t>
-            </a:r>
-            <a:r>
-              <a:rPr lang="en-US" dirty="0" smtClean="0">
-                <a:latin typeface="Red Hat Mono Light" panose="02010309040201060303" pitchFamily="49" charset="0"/>
-              </a:rPr>
-              <a:t> or .</a:t>
-            </a:r>
-            <a:r>
-              <a:rPr lang="en-US" dirty="0" err="1" smtClean="0">
-                <a:latin typeface="Red Hat Mono Light" panose="02010309040201060303" pitchFamily="49" charset="0"/>
-              </a:rPr>
-              <a:t>Rmd</a:t>
-            </a:r>
-            <a:r>
-              <a:rPr lang="en-US" dirty="0" smtClean="0">
-                <a:latin typeface="Red Hat Mono Light" panose="02010309040201060303" pitchFamily="49" charset="0"/>
-              </a:rPr>
-              <a:t> files as the rendered version not just in the raw </a:t>
-            </a:r>
-            <a:r>
-              <a:rPr lang="en-US" dirty="0" smtClean="0">
-                <a:latin typeface="Red Hat Mono Light" panose="02010309040201060303" pitchFamily="49" charset="0"/>
-              </a:rPr>
-              <a:t>file.</a:t>
-            </a:r>
-            <a:endParaRPr lang="en-US" dirty="0" smtClean="0">
-              <a:latin typeface="Red Hat Mono Light" panose="02010309040201060303" pitchFamily="49" charset="0"/>
-            </a:endParaRPr>
+              <a:t>As a guideline, commit parts of code intended for a specific change.</a:t>
+            </a:r>
+            <a:endParaRPr lang="en-US" dirty="0" smtClean="0"/>
           </a:p>
           <a:p>
             <a:r>
               <a:rPr lang="en-US" dirty="0" smtClean="0"/>
-              <a:t>To</a:t>
-            </a:r>
-            <a:r>
-              <a:rPr lang="en-US" baseline="0" dirty="0" smtClean="0"/>
-              <a:t> set this up, go to settings and Pages on the left hand panel, then select the branch you want to be the main page and which branch. </a:t>
-            </a:r>
+              <a:t>Commit </a:t>
+            </a:r>
+            <a:r>
+              <a:rPr lang="en-US" dirty="0" smtClean="0"/>
+              <a:t>change and add commit message</a:t>
+            </a:r>
+          </a:p>
+          <a:p>
+            <a:pPr lvl="1"/>
+            <a:r>
+              <a:rPr lang="en-US" dirty="0" smtClean="0"/>
+              <a:t>Short but descriptive</a:t>
+            </a:r>
+          </a:p>
+          <a:p>
+            <a:r>
+              <a:rPr lang="en-US" dirty="0" smtClean="0"/>
+              <a:t>Push changes to repository</a:t>
+            </a:r>
+          </a:p>
+          <a:p>
+            <a:pPr lvl="1"/>
+            <a:r>
+              <a:rPr lang="en-US" dirty="0" smtClean="0"/>
+              <a:t>Choose which branch to push to</a:t>
+            </a:r>
+          </a:p>
+          <a:p>
+            <a:pPr lvl="1"/>
+            <a:r>
+              <a:rPr lang="en-US" dirty="0" smtClean="0"/>
+              <a:t>Can push multiple commits at once</a:t>
+            </a:r>
+          </a:p>
+          <a:p>
+            <a:r>
+              <a:rPr lang="en-US" dirty="0" smtClean="0"/>
+              <a:t>Pull before starting a new session to make sure you have the most updated version</a:t>
+            </a:r>
+          </a:p>
+          <a:p>
             <a:endParaRPr lang="en-US" dirty="0"/>
           </a:p>
         </p:txBody>
@@ -1280,7 +1362,7 @@
           <a:p>
             <a:fld id="{F6075E4F-4EE8-4477-BD93-32977E8FFBBF}" type="slidenum">
               <a:rPr lang="en-US" smtClean="0"/>
-              <a:t>10</a:t>
+              <a:t>7</a:t>
             </a:fld>
             <a:endParaRPr lang="en-US"/>
           </a:p>
@@ -1289,7 +1371,7 @@
     </p:spTree>
     <p:extLst>
       <p:ext uri="{BB962C8B-B14F-4D97-AF65-F5344CB8AC3E}">
-        <p14:creationId xmlns:p14="http://schemas.microsoft.com/office/powerpoint/2010/main" val="1085667436"/>
+        <p14:creationId xmlns:p14="http://schemas.microsoft.com/office/powerpoint/2010/main" val="2175215945"/>
       </p:ext>
     </p:extLst>
   </p:cSld>
@@ -1343,50 +1425,7 @@
           <a:bodyPr/>
           <a:lstStyle/>
           <a:p>
-            <a:r>
-              <a:rPr lang="en-US" dirty="0" smtClean="0"/>
-              <a:t>For</a:t>
-            </a:r>
-            <a:r>
-              <a:rPr lang="en-US" baseline="0" dirty="0" smtClean="0"/>
-              <a:t> using </a:t>
-            </a:r>
-            <a:r>
-              <a:rPr lang="en-US" baseline="0" dirty="0" err="1" smtClean="0"/>
-              <a:t>Rprojects</a:t>
-            </a:r>
-            <a:r>
-              <a:rPr lang="en-US" baseline="0" dirty="0" smtClean="0"/>
-              <a:t>, use the package here for easily navigating through files</a:t>
-            </a:r>
-          </a:p>
-          <a:p>
-            <a:r>
-              <a:rPr lang="en-US" baseline="0" dirty="0" smtClean="0"/>
-              <a:t>Use the </a:t>
-            </a:r>
-            <a:r>
-              <a:rPr lang="en-US" baseline="0" dirty="0" err="1" smtClean="0"/>
-              <a:t>gitignore</a:t>
-            </a:r>
-            <a:r>
-              <a:rPr lang="en-US" baseline="0" dirty="0" smtClean="0"/>
-              <a:t> file to keep artifact files (extra </a:t>
-            </a:r>
-            <a:r>
-              <a:rPr lang="en-US" baseline="0" dirty="0" err="1" smtClean="0"/>
-              <a:t>ss</a:t>
-            </a:r>
-            <a:r>
-              <a:rPr lang="en-US" baseline="0" dirty="0" smtClean="0"/>
-              <a:t> files), sensitive data, large files, or R environments from being pushed to the repo</a:t>
-            </a:r>
-          </a:p>
-          <a:p>
-            <a:endParaRPr lang="en-US" baseline="0" dirty="0" smtClean="0"/>
-          </a:p>
-          <a:p>
-            <a:endParaRPr lang="en-US" dirty="0"/>
+            <a:endParaRPr lang="en-US" sz="1050" dirty="0"/>
           </a:p>
         </p:txBody>
       </p:sp>
@@ -1407,7 +1446,7 @@
           <a:p>
             <a:fld id="{F6075E4F-4EE8-4477-BD93-32977E8FFBBF}" type="slidenum">
               <a:rPr lang="en-US" smtClean="0"/>
-              <a:t>11</a:t>
+              <a:t>8</a:t>
             </a:fld>
             <a:endParaRPr lang="en-US"/>
           </a:p>
@@ -1416,7 +1455,7 @@
     </p:spTree>
     <p:extLst>
       <p:ext uri="{BB962C8B-B14F-4D97-AF65-F5344CB8AC3E}">
-        <p14:creationId xmlns:p14="http://schemas.microsoft.com/office/powerpoint/2010/main" val="3796798792"/>
+        <p14:creationId xmlns:p14="http://schemas.microsoft.com/office/powerpoint/2010/main" val="2658229831"/>
       </p:ext>
     </p:extLst>
   </p:cSld>
@@ -1472,55 +1511,32 @@
           <a:p>
             <a:r>
               <a:rPr lang="en-US" dirty="0" smtClean="0"/>
-              <a:t>Create a separate folder that only contains confidential data and add this folder to the </a:t>
-            </a:r>
-            <a:r>
-              <a:rPr lang="en-US" dirty="0" err="1" smtClean="0"/>
-              <a:t>gitignore</a:t>
-            </a:r>
+              <a:t>When working with others, use branches </a:t>
+            </a:r>
+          </a:p>
+          <a:p>
             <a:r>
               <a:rPr lang="en-US" dirty="0" smtClean="0"/>
-              <a:t> file.</a:t>
+              <a:t>Branches allow someone to work on a section without affecting the main branch </a:t>
             </a:r>
           </a:p>
           <a:p>
             <a:r>
               <a:rPr lang="en-US" dirty="0" smtClean="0"/>
-              <a:t>Use a common filename structure (i.e. *_CON.csv) for all files that are confidential. This allows you to add that file name to the </a:t>
-            </a:r>
-            <a:r>
-              <a:rPr lang="en-US" dirty="0" err="1" smtClean="0"/>
-              <a:t>gitignore</a:t>
-            </a:r>
+              <a:t>Create a new branch for each major step of development</a:t>
+            </a:r>
+          </a:p>
+          <a:p>
+            <a:pPr lvl="1"/>
             <a:r>
               <a:rPr lang="en-US" dirty="0" smtClean="0"/>
-              <a:t> file, creating a second check that it will not be pushed to the repository as well as helping to identify that data set as confidential to other collaborators.</a:t>
+              <a:t>Data prep, data analysis, model development, results </a:t>
             </a:r>
           </a:p>
           <a:p>
             <a:r>
               <a:rPr lang="en-US" dirty="0" smtClean="0"/>
-              <a:t>Use R packages such as keyring to store credentials such as username and passwords that you do not want to write out in your code</a:t>
-            </a:r>
-          </a:p>
-          <a:p>
-            <a:r>
-              <a:rPr lang="en-US" dirty="0" smtClean="0"/>
-              <a:t>Use R packages such as </a:t>
-            </a:r>
-            <a:r>
-              <a:rPr lang="en-US" dirty="0" err="1" smtClean="0"/>
-              <a:t>dotenv</a:t>
-            </a:r>
-            <a:r>
-              <a:rPr lang="en-US" dirty="0" smtClean="0"/>
-              <a:t> to create variables for your environment that hides the name or link to confidential data</a:t>
-            </a:r>
-          </a:p>
-          <a:p>
-            <a:r>
-              <a:rPr lang="en-US" dirty="0" smtClean="0"/>
-              <a:t>Remember, the data is confidential but what you do to the data is not, so keep the initial prep script short and create a non-confidential version of the dataset that can be shared on the repo</a:t>
+              <a:t>Integrate branch changes with PRs to main branch</a:t>
             </a:r>
           </a:p>
           <a:p>
@@ -1545,7 +1561,7 @@
           <a:p>
             <a:fld id="{F6075E4F-4EE8-4477-BD93-32977E8FFBBF}" type="slidenum">
               <a:rPr lang="en-US" smtClean="0"/>
-              <a:t>12</a:t>
+              <a:t>9</a:t>
             </a:fld>
             <a:endParaRPr lang="en-US"/>
           </a:p>
@@ -1554,7 +1570,337 @@
     </p:spTree>
     <p:extLst>
       <p:ext uri="{BB962C8B-B14F-4D97-AF65-F5344CB8AC3E}">
-        <p14:creationId xmlns:p14="http://schemas.microsoft.com/office/powerpoint/2010/main" val="1646083546"/>
+        <p14:creationId xmlns:p14="http://schemas.microsoft.com/office/powerpoint/2010/main" val="304653265"/>
+      </p:ext>
+    </p:extLst>
+  </p:cSld>
+  <p:clrMapOvr>
+    <a:masterClrMapping/>
+  </p:clrMapOvr>
+</p:notes>
+</file>
+
+<file path=ppt/notesSlides/notesSlide8.xml><?xml version="1.0" encoding="utf-8"?>
+<p:notes xmlns:a="http://schemas.openxmlformats.org/drawingml/2006/main" xmlns:r="http://schemas.openxmlformats.org/officeDocument/2006/relationships" xmlns:p="http://schemas.openxmlformats.org/presentationml/2006/main">
+  <p:cSld>
+    <p:spTree>
+      <p:nvGrpSpPr>
+        <p:cNvPr id="1" name=""/>
+        <p:cNvGrpSpPr/>
+        <p:nvPr/>
+      </p:nvGrpSpPr>
+      <p:grpSpPr>
+        <a:xfrm>
+          <a:off x="0" y="0"/>
+          <a:ext cx="0" cy="0"/>
+          <a:chOff x="0" y="0"/>
+          <a:chExt cx="0" cy="0"/>
+        </a:xfrm>
+      </p:grpSpPr>
+      <p:sp>
+        <p:nvSpPr>
+          <p:cNvPr id="2" name="Slide Image Placeholder 1"/>
+          <p:cNvSpPr>
+            <a:spLocks noGrp="1" noRot="1" noChangeAspect="1"/>
+          </p:cNvSpPr>
+          <p:nvPr>
+            <p:ph type="sldImg"/>
+          </p:nvPr>
+        </p:nvSpPr>
+        <p:spPr/>
+      </p:sp>
+      <p:sp>
+        <p:nvSpPr>
+          <p:cNvPr id="3" name="Notes Placeholder 2"/>
+          <p:cNvSpPr>
+            <a:spLocks noGrp="1"/>
+          </p:cNvSpPr>
+          <p:nvPr>
+            <p:ph type="body" idx="1"/>
+          </p:nvPr>
+        </p:nvSpPr>
+        <p:spPr/>
+        <p:txBody>
+          <a:bodyPr/>
+          <a:lstStyle/>
+          <a:p>
+            <a:pPr>
+              <a:lnSpc>
+                <a:spcPct val="100000"/>
+              </a:lnSpc>
+              <a:spcAft>
+                <a:spcPts val="1200"/>
+              </a:spcAft>
+            </a:pPr>
+            <a:r>
+              <a:rPr lang="en-US" dirty="0" smtClean="0">
+                <a:latin typeface="Red Hat Mono Light" panose="02010309040201060303" pitchFamily="49" charset="0"/>
+              </a:rPr>
+              <a:t>Set up a GitHub Pages for the repo which is a website hosted by </a:t>
+            </a:r>
+            <a:r>
+              <a:rPr lang="en-US" dirty="0" err="1" smtClean="0">
+                <a:latin typeface="Red Hat Mono Light" panose="02010309040201060303" pitchFamily="49" charset="0"/>
+              </a:rPr>
+              <a:t>github</a:t>
+            </a:r>
+            <a:r>
+              <a:rPr lang="en-US" dirty="0" smtClean="0">
+                <a:latin typeface="Red Hat Mono Light" panose="02010309040201060303" pitchFamily="49" charset="0"/>
+              </a:rPr>
+              <a:t>.</a:t>
+            </a:r>
+            <a:r>
+              <a:rPr lang="en-US" baseline="0" dirty="0" smtClean="0">
+                <a:latin typeface="Red Hat Mono Light" panose="02010309040201060303" pitchFamily="49" charset="0"/>
+              </a:rPr>
+              <a:t> The benefit of this is that it a</a:t>
+            </a:r>
+            <a:r>
+              <a:rPr lang="en-US" dirty="0" smtClean="0">
+                <a:latin typeface="Red Hat Mono Light" panose="02010309040201060303" pitchFamily="49" charset="0"/>
+              </a:rPr>
+              <a:t>llows you to host </a:t>
+            </a:r>
+            <a:r>
+              <a:rPr lang="en-US" dirty="0" err="1" smtClean="0">
+                <a:latin typeface="Red Hat Mono Light" panose="02010309040201060303" pitchFamily="49" charset="0"/>
+              </a:rPr>
+              <a:t>htlm</a:t>
+            </a:r>
+            <a:r>
+              <a:rPr lang="en-US" dirty="0" smtClean="0">
+                <a:latin typeface="Red Hat Mono Light" panose="02010309040201060303" pitchFamily="49" charset="0"/>
+              </a:rPr>
+              <a:t> files s</a:t>
+            </a:r>
+            <a:r>
+              <a:rPr lang="en-US" baseline="0" dirty="0" smtClean="0">
+                <a:latin typeface="Red Hat Mono Light" panose="02010309040201060303" pitchFamily="49" charset="0"/>
+              </a:rPr>
+              <a:t>o you </a:t>
+            </a:r>
+            <a:r>
+              <a:rPr lang="en-US" dirty="0" smtClean="0">
+                <a:latin typeface="Red Hat Mono Light" panose="02010309040201060303" pitchFamily="49" charset="0"/>
+              </a:rPr>
+              <a:t>can view .</a:t>
+            </a:r>
+            <a:r>
+              <a:rPr lang="en-US" dirty="0" err="1" smtClean="0">
+                <a:latin typeface="Red Hat Mono Light" panose="02010309040201060303" pitchFamily="49" charset="0"/>
+              </a:rPr>
+              <a:t>Rmarkdown</a:t>
+            </a:r>
+            <a:r>
+              <a:rPr lang="en-US" dirty="0" smtClean="0">
+                <a:latin typeface="Red Hat Mono Light" panose="02010309040201060303" pitchFamily="49" charset="0"/>
+              </a:rPr>
+              <a:t> or .</a:t>
+            </a:r>
+            <a:r>
+              <a:rPr lang="en-US" dirty="0" err="1" smtClean="0">
+                <a:latin typeface="Red Hat Mono Light" panose="02010309040201060303" pitchFamily="49" charset="0"/>
+              </a:rPr>
+              <a:t>Rmd</a:t>
+            </a:r>
+            <a:r>
+              <a:rPr lang="en-US" dirty="0" smtClean="0">
+                <a:latin typeface="Red Hat Mono Light" panose="02010309040201060303" pitchFamily="49" charset="0"/>
+              </a:rPr>
+              <a:t> files as the rendered version not just in the raw file.</a:t>
+            </a:r>
+          </a:p>
+          <a:p>
+            <a:r>
+              <a:rPr lang="en-US" dirty="0" smtClean="0"/>
+              <a:t>To</a:t>
+            </a:r>
+            <a:r>
+              <a:rPr lang="en-US" baseline="0" dirty="0" smtClean="0"/>
+              <a:t> set this up, go to settings and Pages on the left hand panel, then select the branch you want to be the main page and which branch. </a:t>
+            </a:r>
+            <a:endParaRPr lang="en-US" baseline="0" dirty="0" smtClean="0"/>
+          </a:p>
+          <a:p>
+            <a:r>
+              <a:rPr lang="en-US" baseline="0" dirty="0" smtClean="0"/>
+              <a:t>{</a:t>
+            </a:r>
+            <a:r>
+              <a:rPr lang="en-US" baseline="0" dirty="0" err="1" smtClean="0"/>
+              <a:t>pkgdown</a:t>
+            </a:r>
+            <a:r>
+              <a:rPr lang="en-US" baseline="0" dirty="0" smtClean="0"/>
+              <a:t>} creates a </a:t>
+            </a:r>
+            <a:r>
+              <a:rPr lang="en-US" baseline="0" dirty="0" err="1" smtClean="0"/>
+              <a:t>github</a:t>
+            </a:r>
+            <a:r>
+              <a:rPr lang="en-US" baseline="0" dirty="0" smtClean="0"/>
+              <a:t> site for r package</a:t>
+            </a:r>
+            <a:endParaRPr lang="en-US" dirty="0"/>
+          </a:p>
+        </p:txBody>
+      </p:sp>
+      <p:sp>
+        <p:nvSpPr>
+          <p:cNvPr id="4" name="Slide Number Placeholder 3"/>
+          <p:cNvSpPr>
+            <a:spLocks noGrp="1"/>
+          </p:cNvSpPr>
+          <p:nvPr>
+            <p:ph type="sldNum" sz="quarter" idx="10"/>
+          </p:nvPr>
+        </p:nvSpPr>
+        <p:spPr/>
+        <p:txBody>
+          <a:bodyPr/>
+          <a:lstStyle/>
+          <a:p>
+            <a:fld id="{F6075E4F-4EE8-4477-BD93-32977E8FFBBF}" type="slidenum">
+              <a:rPr lang="en-US" smtClean="0"/>
+              <a:t>10</a:t>
+            </a:fld>
+            <a:endParaRPr lang="en-US"/>
+          </a:p>
+        </p:txBody>
+      </p:sp>
+    </p:spTree>
+    <p:extLst>
+      <p:ext uri="{BB962C8B-B14F-4D97-AF65-F5344CB8AC3E}">
+        <p14:creationId xmlns:p14="http://schemas.microsoft.com/office/powerpoint/2010/main" val="1085667436"/>
+      </p:ext>
+    </p:extLst>
+  </p:cSld>
+  <p:clrMapOvr>
+    <a:masterClrMapping/>
+  </p:clrMapOvr>
+</p:notes>
+</file>
+
+<file path=ppt/notesSlides/notesSlide9.xml><?xml version="1.0" encoding="utf-8"?>
+<p:notes xmlns:a="http://schemas.openxmlformats.org/drawingml/2006/main" xmlns:r="http://schemas.openxmlformats.org/officeDocument/2006/relationships" xmlns:p="http://schemas.openxmlformats.org/presentationml/2006/main">
+  <p:cSld>
+    <p:spTree>
+      <p:nvGrpSpPr>
+        <p:cNvPr id="1" name=""/>
+        <p:cNvGrpSpPr/>
+        <p:nvPr/>
+      </p:nvGrpSpPr>
+      <p:grpSpPr>
+        <a:xfrm>
+          <a:off x="0" y="0"/>
+          <a:ext cx="0" cy="0"/>
+          <a:chOff x="0" y="0"/>
+          <a:chExt cx="0" cy="0"/>
+        </a:xfrm>
+      </p:grpSpPr>
+      <p:sp>
+        <p:nvSpPr>
+          <p:cNvPr id="2" name="Slide Image Placeholder 1"/>
+          <p:cNvSpPr>
+            <a:spLocks noGrp="1" noRot="1" noChangeAspect="1"/>
+          </p:cNvSpPr>
+          <p:nvPr>
+            <p:ph type="sldImg"/>
+          </p:nvPr>
+        </p:nvSpPr>
+        <p:spPr/>
+      </p:sp>
+      <p:sp>
+        <p:nvSpPr>
+          <p:cNvPr id="3" name="Notes Placeholder 2"/>
+          <p:cNvSpPr>
+            <a:spLocks noGrp="1"/>
+          </p:cNvSpPr>
+          <p:nvPr>
+            <p:ph type="body" idx="1"/>
+          </p:nvPr>
+        </p:nvSpPr>
+        <p:spPr/>
+        <p:txBody>
+          <a:bodyPr/>
+          <a:lstStyle/>
+          <a:p>
+            <a:r>
+              <a:rPr lang="en-US" dirty="0" smtClean="0"/>
+              <a:t>For</a:t>
+            </a:r>
+            <a:r>
+              <a:rPr lang="en-US" baseline="0" dirty="0" smtClean="0"/>
+              <a:t> using </a:t>
+            </a:r>
+            <a:r>
+              <a:rPr lang="en-US" baseline="0" dirty="0" err="1" smtClean="0"/>
+              <a:t>Rprojects</a:t>
+            </a:r>
+            <a:r>
+              <a:rPr lang="en-US" baseline="0" dirty="0" smtClean="0"/>
+              <a:t>, use the package here for easily navigating through files</a:t>
+            </a:r>
+          </a:p>
+          <a:p>
+            <a:r>
+              <a:rPr lang="en-US" baseline="0" dirty="0" smtClean="0"/>
+              <a:t>Use the </a:t>
+            </a:r>
+            <a:r>
+              <a:rPr lang="en-US" baseline="0" dirty="0" err="1" smtClean="0"/>
+              <a:t>gitignore</a:t>
+            </a:r>
+            <a:r>
+              <a:rPr lang="en-US" baseline="0" dirty="0" smtClean="0"/>
+              <a:t> file to keep artifact files (extra </a:t>
+            </a:r>
+            <a:r>
+              <a:rPr lang="en-US" baseline="0" dirty="0" err="1" smtClean="0"/>
+              <a:t>ss</a:t>
+            </a:r>
+            <a:r>
+              <a:rPr lang="en-US" baseline="0" dirty="0" smtClean="0"/>
+              <a:t> files), sensitive data, large files, or R environments from being pushed to the repo</a:t>
+            </a:r>
+          </a:p>
+          <a:p>
+            <a:endParaRPr lang="en-US" baseline="0" dirty="0" smtClean="0"/>
+          </a:p>
+          <a:p>
+            <a:endParaRPr lang="en-US" dirty="0"/>
+          </a:p>
+        </p:txBody>
+      </p:sp>
+      <p:sp>
+        <p:nvSpPr>
+          <p:cNvPr id="4" name="Slide Number Placeholder 3"/>
+          <p:cNvSpPr>
+            <a:spLocks noGrp="1"/>
+          </p:cNvSpPr>
+          <p:nvPr>
+            <p:ph type="sldNum" sz="quarter" idx="10"/>
+          </p:nvPr>
+        </p:nvSpPr>
+        <p:spPr/>
+        <p:txBody>
+          <a:bodyPr/>
+          <a:lstStyle/>
+          <a:p>
+            <a:fld id="{F6075E4F-4EE8-4477-BD93-32977E8FFBBF}" type="slidenum">
+              <a:rPr lang="en-US" smtClean="0"/>
+              <a:t>11</a:t>
+            </a:fld>
+            <a:endParaRPr lang="en-US"/>
+          </a:p>
+        </p:txBody>
+      </p:sp>
+    </p:spTree>
+    <p:extLst>
+      <p:ext uri="{BB962C8B-B14F-4D97-AF65-F5344CB8AC3E}">
+        <p14:creationId xmlns:p14="http://schemas.microsoft.com/office/powerpoint/2010/main" val="3796798792"/>
       </p:ext>
     </p:extLst>
   </p:cSld>
@@ -1695,7 +2041,7 @@
           <a:p>
             <a:fld id="{56C85CB4-DB76-4442-9A43-AE556D77ADB1}" type="datetime1">
               <a:rPr lang="en-US" smtClean="0"/>
-              <a:t>3/24/2022</a:t>
+              <a:t>4/5/2022</a:t>
             </a:fld>
             <a:endParaRPr lang="en-US" dirty="0"/>
           </a:p>
@@ -1866,7 +2212,7 @@
           <a:p>
             <a:fld id="{BCD63DF2-C253-4205-867C-60420319D43A}" type="datetime1">
               <a:rPr lang="en-US" smtClean="0"/>
-              <a:t>3/24/2022</a:t>
+              <a:t>4/5/2022</a:t>
             </a:fld>
             <a:endParaRPr lang="en-US"/>
           </a:p>
@@ -2046,7 +2392,7 @@
           <a:p>
             <a:fld id="{F668C1BF-5A24-49C9-9735-DE6E442F4DE0}" type="datetime1">
               <a:rPr lang="en-US" smtClean="0"/>
-              <a:t>3/24/2022</a:t>
+              <a:t>4/5/2022</a:t>
             </a:fld>
             <a:endParaRPr lang="en-US"/>
           </a:p>
@@ -2512,7 +2858,7 @@
           <a:p>
             <a:fld id="{85CFCC4A-4D1E-4F35-9929-A051B58E0F9D}" type="datetime1">
               <a:rPr lang="en-US" smtClean="0"/>
-              <a:t>3/24/2022</a:t>
+              <a:t>4/5/2022</a:t>
             </a:fld>
             <a:endParaRPr lang="en-US"/>
           </a:p>
@@ -2742,7 +3088,7 @@
           <a:p>
             <a:fld id="{56C85CB4-DB76-4442-9A43-AE556D77ADB1}" type="datetime1">
               <a:rPr lang="en-US" smtClean="0"/>
-              <a:t>3/24/2022</a:t>
+              <a:t>4/5/2022</a:t>
             </a:fld>
             <a:endParaRPr lang="en-US" dirty="0"/>
           </a:p>
@@ -2989,7 +3335,7 @@
           <a:p>
             <a:fld id="{263BCDFF-5CDF-4F9B-9E39-06A21E1200C8}" type="datetime1">
               <a:rPr lang="en-US" smtClean="0"/>
-              <a:t>3/24/2022</a:t>
+              <a:t>4/5/2022</a:t>
             </a:fld>
             <a:endParaRPr lang="en-US"/>
           </a:p>
@@ -3221,7 +3567,7 @@
           <a:p>
             <a:fld id="{85CFCC4A-4D1E-4F35-9929-A051B58E0F9D}" type="datetime1">
               <a:rPr lang="en-US" smtClean="0"/>
-              <a:t>3/24/2022</a:t>
+              <a:t>4/5/2022</a:t>
             </a:fld>
             <a:endParaRPr lang="en-US"/>
           </a:p>
@@ -3589,7 +3935,7 @@
           <a:p>
             <a:fld id="{9CE4358E-32CF-40E2-8FA2-E626B96E40DC}" type="datetime1">
               <a:rPr lang="en-US" smtClean="0"/>
-              <a:t>3/24/2022</a:t>
+              <a:t>4/5/2022</a:t>
             </a:fld>
             <a:endParaRPr lang="en-US"/>
           </a:p>
@@ -3707,7 +4053,7 @@
           <a:p>
             <a:fld id="{BFA801A8-7517-453A-A153-9CD48DB2B92A}" type="datetime1">
               <a:rPr lang="en-US" smtClean="0"/>
-              <a:t>3/24/2022</a:t>
+              <a:t>4/5/2022</a:t>
             </a:fld>
             <a:endParaRPr lang="en-US"/>
           </a:p>
@@ -3802,7 +4148,7 @@
           <a:p>
             <a:fld id="{F80F1DEE-622D-4659-A56F-B16AB5771332}" type="datetime1">
               <a:rPr lang="en-US" smtClean="0"/>
-              <a:t>3/24/2022</a:t>
+              <a:t>4/5/2022</a:t>
             </a:fld>
             <a:endParaRPr lang="en-US"/>
           </a:p>
@@ -4079,7 +4425,7 @@
           <a:p>
             <a:fld id="{D4F55DC5-8E1B-4EEA-8280-13C94BA0C35F}" type="datetime1">
               <a:rPr lang="en-US" smtClean="0"/>
-              <a:t>3/24/2022</a:t>
+              <a:t>4/5/2022</a:t>
             </a:fld>
             <a:endParaRPr lang="en-US"/>
           </a:p>
@@ -4332,7 +4678,7 @@
           <a:p>
             <a:fld id="{A621C3C6-68AC-44FD-ACED-67B791FE6CCF}" type="datetime1">
               <a:rPr lang="en-US" smtClean="0"/>
-              <a:t>3/24/2022</a:t>
+              <a:t>4/5/2022</a:t>
             </a:fld>
             <a:endParaRPr lang="en-US"/>
           </a:p>
@@ -4545,7 +4891,7 @@
           <a:p>
             <a:fld id="{E655DCC5-4CF7-4C95-95FF-704B39D7A6AF}" type="datetime1">
               <a:rPr lang="en-US" smtClean="0"/>
-              <a:t>3/24/2022</a:t>
+              <a:t>4/5/2022</a:t>
             </a:fld>
             <a:endParaRPr lang="en-US"/>
           </a:p>
@@ -7150,7 +7496,15 @@
             </a:r>
             <a:r>
               <a:rPr lang="en-US" dirty="0"/>
-              <a:t>packages such as keyring to store </a:t>
+              <a:t>packages such as </a:t>
+            </a:r>
+            <a:r>
+              <a:rPr lang="en-US" dirty="0" smtClean="0"/>
+              <a:t>{keyring} </a:t>
+            </a:r>
+            <a:r>
+              <a:rPr lang="en-US" dirty="0"/>
+              <a:t>to store </a:t>
             </a:r>
             <a:r>
               <a:rPr lang="en-US" dirty="0" smtClean="0"/>
@@ -7176,12 +7530,20 @@
               <a:t>packages such as </a:t>
             </a:r>
             <a:r>
-              <a:rPr lang="en-US" dirty="0" err="1"/>
+              <a:rPr lang="en-US" dirty="0" smtClean="0"/>
+              <a:t>{</a:t>
+            </a:r>
+            <a:r>
+              <a:rPr lang="en-US" dirty="0" err="1" smtClean="0"/>
               <a:t>dotenv</a:t>
             </a:r>
             <a:r>
+              <a:rPr lang="en-US" dirty="0" smtClean="0"/>
+              <a:t>} </a:t>
+            </a:r>
+            <a:r>
               <a:rPr lang="en-US" dirty="0"/>
-              <a:t> to create variables for your environment </a:t>
+              <a:t>to create variables for your environment </a:t>
             </a:r>
             <a:endParaRPr lang="en-US" dirty="0" smtClean="0"/>
           </a:p>
@@ -8873,7 +9235,47 @@
                 <a:ea typeface="Red Hat Mono Light" panose="02010309040201060303" pitchFamily="49" charset="0"/>
                 <a:cs typeface="Red Hat Mono Light" panose="02010309040201060303" pitchFamily="49" charset="0"/>
               </a:rPr>
-              <a:t>Installed locally on computer</a:t>
+              <a:t>Installed locally on </a:t>
+            </a:r>
+            <a:r>
+              <a:rPr lang="en-US" sz="2000" dirty="0" smtClean="0">
+                <a:solidFill>
+                  <a:srgbClr val="3B4252"/>
+                </a:solidFill>
+                <a:latin typeface="Red Hat Mono Light" panose="02010309040201060303" pitchFamily="49" charset="0"/>
+                <a:ea typeface="Red Hat Mono Light" panose="02010309040201060303" pitchFamily="49" charset="0"/>
+                <a:cs typeface="Red Hat Mono Light" panose="02010309040201060303" pitchFamily="49" charset="0"/>
+              </a:rPr>
+              <a:t>computer</a:t>
+            </a:r>
+          </a:p>
+          <a:p>
+            <a:pPr>
+              <a:lnSpc>
+                <a:spcPct val="150000"/>
+              </a:lnSpc>
+              <a:buFont typeface="Courier New" panose="02070309020205020404" pitchFamily="49" charset="0"/>
+              <a:buChar char="*"/>
+            </a:pPr>
+            <a:r>
+              <a:rPr lang="en-US" sz="2000" dirty="0" smtClean="0"/>
+              <a:t>Need to have </a:t>
+            </a:r>
+            <a:r>
+              <a:rPr lang="en-US" sz="2000" dirty="0" err="1" smtClean="0"/>
+              <a:t>git</a:t>
+            </a:r>
+            <a:r>
+              <a:rPr lang="en-US" sz="2000" dirty="0" smtClean="0"/>
+              <a:t> (</a:t>
+            </a:r>
+            <a:r>
+              <a:rPr lang="en-US" sz="2000" dirty="0" err="1" smtClean="0"/>
+              <a:t>git</a:t>
+            </a:r>
+            <a:r>
+              <a:rPr lang="en-US" sz="2000" dirty="0" smtClean="0"/>
+              <a:t> for Windows) installed before using any GUI or service</a:t>
             </a:r>
             <a:endParaRPr lang="en-US" sz="2000" dirty="0">
               <a:solidFill>
@@ -8885,34 +9287,9 @@
             </a:endParaRPr>
           </a:p>
           <a:p>
-            <a:pPr>
-              <a:lnSpc>
-                <a:spcPct val="150000"/>
-              </a:lnSpc>
-              <a:buFont typeface="Courier New" panose="02070309020205020404" pitchFamily="49" charset="0"/>
-              <a:buChar char="*"/>
+            <a:pPr marL="0" indent="0">
+              <a:buNone/>
             </a:pPr>
-            <a:r>
-              <a:rPr lang="en-US" sz="2000" dirty="0" smtClean="0">
-                <a:solidFill>
-                  <a:srgbClr val="3B4252"/>
-                </a:solidFill>
-                <a:latin typeface="Red Hat Mono Light" panose="02010309040201060303" pitchFamily="49" charset="0"/>
-                <a:ea typeface="Red Hat Mono Light" panose="02010309040201060303" pitchFamily="49" charset="0"/>
-                <a:cs typeface="Red Hat Mono Light" panose="02010309040201060303" pitchFamily="49" charset="0"/>
-              </a:rPr>
-              <a:t>Use with command line</a:t>
-            </a:r>
-            <a:endParaRPr lang="en-US" sz="2000" dirty="0">
-              <a:solidFill>
-                <a:srgbClr val="3B4252"/>
-              </a:solidFill>
-              <a:latin typeface="Red Hat Mono Light" panose="02010309040201060303" pitchFamily="49" charset="0"/>
-              <a:ea typeface="Red Hat Mono Light" panose="02010309040201060303" pitchFamily="49" charset="0"/>
-              <a:cs typeface="Red Hat Mono Light" panose="02010309040201060303" pitchFamily="49" charset="0"/>
-            </a:endParaRPr>
-          </a:p>
-          <a:p>
             <a:endParaRPr lang="en-US" sz="2000" dirty="0">
               <a:solidFill>
                 <a:srgbClr val="3B4252"/>
@@ -9050,7 +9427,7 @@
           <p:nvPr/>
         </p:nvPicPr>
         <p:blipFill>
-          <a:blip r:embed="rId2" cstate="print">
+          <a:blip r:embed="rId3" cstate="print">
             <a:extLst>
               <a:ext uri="{28A0092B-C50C-407E-A947-70E740481C1C}">
                 <a14:useLocalDpi xmlns:a14="http://schemas.microsoft.com/office/drawing/2010/main" val="0"/>
@@ -9176,7 +9553,7 @@
             <p:nvPr/>
           </p:nvPicPr>
           <p:blipFill>
-            <a:blip r:embed="rId3" cstate="print">
+            <a:blip r:embed="rId4" cstate="print">
               <a:extLst>
                 <a:ext uri="{28A0092B-C50C-407E-A947-70E740481C1C}">
                   <a14:useLocalDpi xmlns:a14="http://schemas.microsoft.com/office/drawing/2010/main" val="0"/>
@@ -9328,15 +9705,33 @@
                                   </p:childTnLst>
                                 </p:cTn>
                               </p:par>
+                            </p:childTnLst>
+                          </p:cTn>
+                        </p:par>
+                      </p:childTnLst>
+                    </p:cTn>
+                  </p:par>
+                  <p:par>
+                    <p:cTn id="11" fill="hold">
+                      <p:stCondLst>
+                        <p:cond delay="indefinite"/>
+                      </p:stCondLst>
+                      <p:childTnLst>
+                        <p:par>
+                          <p:cTn id="12" fill="hold">
+                            <p:stCondLst>
+                              <p:cond delay="0"/>
+                            </p:stCondLst>
+                            <p:childTnLst>
                               <p:par>
-                                <p:cTn id="11" presetID="10" presetClass="entr" presetSubtype="0" fill="hold" grpId="0" nodeType="withEffect">
+                                <p:cTn id="13" presetID="10" presetClass="entr" presetSubtype="0" fill="hold" grpId="0" nodeType="clickEffect">
                                   <p:stCondLst>
                                     <p:cond delay="0"/>
                                   </p:stCondLst>
                                   <p:childTnLst>
                                     <p:set>
                                       <p:cBhvr>
-                                        <p:cTn id="12" dur="1" fill="hold">
+                                        <p:cTn id="14" dur="1" fill="hold">
                                           <p:stCondLst>
                                             <p:cond delay="0"/>
                                           </p:stCondLst>
@@ -9358,7 +9753,7 @@
                                     </p:set>
                                     <p:animEffect transition="in" filter="fade">
                                       <p:cBhvr>
-                                        <p:cTn id="13" dur="500"/>
+                                        <p:cTn id="15" dur="500"/>
                                         <p:tgtEl>
                                           <p:spTgt spid="6">
                                             <p:txEl>
@@ -9372,14 +9767,14 @@
                                 </p:cTn>
                               </p:par>
                               <p:par>
-                                <p:cTn id="14" presetID="10" presetClass="entr" presetSubtype="0" fill="hold" nodeType="withEffect">
+                                <p:cTn id="16" presetID="10" presetClass="entr" presetSubtype="0" fill="hold" nodeType="withEffect">
                                   <p:stCondLst>
                                     <p:cond delay="0"/>
                                   </p:stCondLst>
                                   <p:childTnLst>
                                     <p:set>
                                       <p:cBhvr>
-                                        <p:cTn id="15" dur="1" fill="hold">
+                                        <p:cTn id="17" dur="1" fill="hold">
                                           <p:stCondLst>
                                             <p:cond delay="0"/>
                                           </p:stCondLst>
@@ -9397,7 +9792,7 @@
                                     </p:set>
                                     <p:animEffect transition="in" filter="fade">
                                       <p:cBhvr>
-                                        <p:cTn id="16" dur="500"/>
+                                        <p:cTn id="18" dur="500"/>
                                         <p:tgtEl>
                                           <p:spTgt spid="3"/>
                                         </p:tgtEl>
@@ -9413,26 +9808,26 @@
                     </p:cTn>
                   </p:par>
                   <p:par>
-                    <p:cTn id="17" fill="hold">
+                    <p:cTn id="19" fill="hold">
                       <p:stCondLst>
                         <p:cond delay="indefinite"/>
                       </p:stCondLst>
                       <p:childTnLst>
                         <p:par>
-                          <p:cTn id="18" fill="hold">
+                          <p:cTn id="20" fill="hold">
                             <p:stCondLst>
                               <p:cond delay="0"/>
                             </p:stCondLst>
                             <p:childTnLst>
                               <p:par>
-                                <p:cTn id="19" presetID="10" presetClass="entr" presetSubtype="0" fill="hold" nodeType="clickEffect">
+                                <p:cTn id="21" presetID="10" presetClass="entr" presetSubtype="0" fill="hold" nodeType="clickEffect">
                                   <p:stCondLst>
                                     <p:cond delay="0"/>
                                   </p:stCondLst>
                                   <p:childTnLst>
                                     <p:set>
                                       <p:cBhvr>
-                                        <p:cTn id="20" dur="1" fill="hold">
+                                        <p:cTn id="22" dur="1" fill="hold">
                                           <p:stCondLst>
                                             <p:cond delay="0"/>
                                           </p:stCondLst>
@@ -9450,7 +9845,7 @@
                                     </p:set>
                                     <p:animEffect transition="in" filter="fade">
                                       <p:cBhvr>
-                                        <p:cTn id="21" dur="500"/>
+                                        <p:cTn id="23" dur="500"/>
                                         <p:tgtEl>
                                           <p:spTgt spid="1026"/>
                                         </p:tgtEl>
@@ -9460,14 +9855,14 @@
                                 </p:cTn>
                               </p:par>
                               <p:par>
-                                <p:cTn id="22" presetID="10" presetClass="entr" presetSubtype="0" fill="hold" grpId="0" nodeType="withEffect">
+                                <p:cTn id="24" presetID="10" presetClass="entr" presetSubtype="0" fill="hold" grpId="0" nodeType="withEffect">
                                   <p:stCondLst>
                                     <p:cond delay="0"/>
                                   </p:stCondLst>
                                   <p:childTnLst>
                                     <p:set>
                                       <p:cBhvr>
-                                        <p:cTn id="23" dur="1" fill="hold">
+                                        <p:cTn id="25" dur="1" fill="hold">
                                           <p:stCondLst>
                                             <p:cond delay="0"/>
                                           </p:stCondLst>
@@ -9489,7 +9884,7 @@
                                     </p:set>
                                     <p:animEffect transition="in" filter="fade">
                                       <p:cBhvr>
-                                        <p:cTn id="24" dur="500"/>
+                                        <p:cTn id="26" dur="500"/>
                                         <p:tgtEl>
                                           <p:spTgt spid="8">
                                             <p:txEl>
@@ -9503,14 +9898,14 @@
                                 </p:cTn>
                               </p:par>
                               <p:par>
-                                <p:cTn id="25" presetID="10" presetClass="entr" presetSubtype="0" fill="hold" grpId="0" nodeType="withEffect">
+                                <p:cTn id="27" presetID="10" presetClass="entr" presetSubtype="0" fill="hold" grpId="0" nodeType="withEffect">
                                   <p:stCondLst>
                                     <p:cond delay="0"/>
                                   </p:stCondLst>
                                   <p:childTnLst>
                                     <p:set>
                                       <p:cBhvr>
-                                        <p:cTn id="26" dur="1" fill="hold">
+                                        <p:cTn id="28" dur="1" fill="hold">
                                           <p:stCondLst>
                                             <p:cond delay="0"/>
                                           </p:stCondLst>
@@ -9532,7 +9927,7 @@
                                     </p:set>
                                     <p:animEffect transition="in" filter="fade">
                                       <p:cBhvr>
-                                        <p:cTn id="27" dur="500"/>
+                                        <p:cTn id="29" dur="500"/>
                                         <p:tgtEl>
                                           <p:spTgt spid="8">
                                             <p:txEl>
@@ -9546,14 +9941,14 @@
                                 </p:cTn>
                               </p:par>
                               <p:par>
-                                <p:cTn id="28" presetID="10" presetClass="entr" presetSubtype="0" fill="hold" grpId="0" nodeType="withEffect">
+                                <p:cTn id="30" presetID="10" presetClass="entr" presetSubtype="0" fill="hold" grpId="0" nodeType="withEffect">
                                   <p:stCondLst>
                                     <p:cond delay="0"/>
                                   </p:stCondLst>
                                   <p:childTnLst>
                                     <p:set>
                                       <p:cBhvr>
-                                        <p:cTn id="29" dur="1" fill="hold">
+                                        <p:cTn id="31" dur="1" fill="hold">
                                           <p:stCondLst>
                                             <p:cond delay="0"/>
                                           </p:stCondLst>
@@ -9575,7 +9970,7 @@
                                     </p:set>
                                     <p:animEffect transition="in" filter="fade">
                                       <p:cBhvr>
-                                        <p:cTn id="30" dur="500"/>
+                                        <p:cTn id="32" dur="500"/>
                                         <p:tgtEl>
                                           <p:spTgt spid="8">
                                             <p:txEl>
@@ -9793,7 +10188,7 @@
           <p:nvPr/>
         </p:nvPicPr>
         <p:blipFill>
-          <a:blip r:embed="rId2" cstate="print">
+          <a:blip r:embed="rId3" cstate="print">
             <a:duotone>
               <a:prstClr val="black"/>
               <a:schemeClr val="accent1">
@@ -9892,7 +10287,7 @@
           <p:nvPr/>
         </p:nvPicPr>
         <p:blipFill>
-          <a:blip r:embed="rId3" cstate="print">
+          <a:blip r:embed="rId4" cstate="print">
             <a:duotone>
               <a:prstClr val="black"/>
               <a:schemeClr val="accent1">
@@ -12770,9 +13165,31 @@
               <a:rPr lang="en-US" sz="2400" dirty="0" smtClean="0">
                 <a:latin typeface="Red Hat Mono Light" panose="02010309040201060303" pitchFamily="49" charset="0"/>
               </a:rPr>
-              <a:t>If committing multiple files, undo and commit individually</a:t>
-            </a:r>
-            <a:endParaRPr lang="en-US" sz="2400" dirty="0">
+              <a:t>If committing multiple files, undo and commit </a:t>
+            </a:r>
+            <a:r>
+              <a:rPr lang="en-US" sz="2400" dirty="0" smtClean="0">
+                <a:latin typeface="Red Hat Mono Light" panose="02010309040201060303" pitchFamily="49" charset="0"/>
+              </a:rPr>
+              <a:t>individually</a:t>
+            </a:r>
+          </a:p>
+          <a:p>
+            <a:pPr lvl="1">
+              <a:lnSpc>
+                <a:spcPct val="100000"/>
+              </a:lnSpc>
+              <a:spcAft>
+                <a:spcPts val="1200"/>
+              </a:spcAft>
+            </a:pPr>
+            <a:r>
+              <a:rPr lang="en-US" sz="1600" dirty="0" smtClean="0">
+                <a:latin typeface="Red Hat Mono Light" panose="02010309040201060303" pitchFamily="49" charset="0"/>
+              </a:rPr>
+              <a:t>For data analysis workflow, not R package</a:t>
+            </a:r>
+            <a:endParaRPr lang="en-US" sz="1600" dirty="0" smtClean="0">
               <a:latin typeface="Red Hat Mono Light" panose="02010309040201060303" pitchFamily="49" charset="0"/>
             </a:endParaRPr>
           </a:p>
@@ -13032,6 +13449,49 @@
                                           <p:spTgt spid="3">
                                             <p:txEl>
                                               <p:pRg st="3" end="3"/>
+                                            </p:txEl>
+                                          </p:spTgt>
+                                        </p:tgtEl>
+                                      </p:cBhvr>
+                                    </p:animEffect>
+                                  </p:childTnLst>
+                                </p:cTn>
+                              </p:par>
+                              <p:par>
+                                <p:cTn id="21" presetID="10" presetClass="entr" presetSubtype="0" fill="hold" grpId="0" nodeType="withEffect">
+                                  <p:stCondLst>
+                                    <p:cond delay="0"/>
+                                  </p:stCondLst>
+                                  <p:childTnLst>
+                                    <p:set>
+                                      <p:cBhvr>
+                                        <p:cTn id="22" dur="1" fill="hold">
+                                          <p:stCondLst>
+                                            <p:cond delay="0"/>
+                                          </p:stCondLst>
+                                        </p:cTn>
+                                        <p:tgtEl>
+                                          <p:spTgt spid="3">
+                                            <p:txEl>
+                                              <p:pRg st="4" end="4"/>
+                                            </p:txEl>
+                                          </p:spTgt>
+                                        </p:tgtEl>
+                                        <p:attrNameLst>
+                                          <p:attrName>style.visibility</p:attrName>
+                                        </p:attrNameLst>
+                                      </p:cBhvr>
+                                      <p:to>
+                                        <p:strVal val="visible"/>
+                                      </p:to>
+                                    </p:set>
+                                    <p:animEffect transition="in" filter="fade">
+                                      <p:cBhvr>
+                                        <p:cTn id="23" dur="500"/>
+                                        <p:tgtEl>
+                                          <p:spTgt spid="3">
+                                            <p:txEl>
+                                              <p:pRg st="4" end="4"/>
                                             </p:txEl>
                                           </p:spTgt>
                                         </p:tgtEl>

</xml_diff>

<commit_message>
appends pptx for Rstudio git interface (clone, commit, push)
</commit_message>
<xml_diff>
--- a/docs/GitHub Workflow for SAP.pptx
+++ b/docs/GitHub Workflow for SAP.pptx
@@ -5,10 +5,10 @@
     <p:sldMasterId id="2147483768" r:id="rId1"/>
   </p:sldMasterIdLst>
   <p:notesMasterIdLst>
-    <p:notesMasterId r:id="rId16"/>
+    <p:notesMasterId r:id="rId19"/>
   </p:notesMasterIdLst>
   <p:handoutMasterIdLst>
-    <p:handoutMasterId r:id="rId17"/>
+    <p:handoutMasterId r:id="rId20"/>
   </p:handoutMasterIdLst>
   <p:sldIdLst>
     <p:sldId id="256" r:id="rId2"/>
@@ -25,6 +25,9 @@
     <p:sldId id="267" r:id="rId13"/>
     <p:sldId id="272" r:id="rId14"/>
     <p:sldId id="273" r:id="rId15"/>
+    <p:sldId id="276" r:id="rId16"/>
+    <p:sldId id="277" r:id="rId17"/>
+    <p:sldId id="278" r:id="rId18"/>
   </p:sldIdLst>
   <p:sldSz cx="12192000" cy="6858000"/>
   <p:notesSz cx="6858000" cy="9144000"/>
@@ -216,7 +219,7 @@
           <a:p>
             <a:fld id="{725B3EBC-B880-4A78-B8E5-BB9890C31678}" type="datetimeFigureOut">
               <a:rPr lang="en-US" smtClean="0"/>
-              <a:t>4/5/2022</a:t>
+              <a:t>4/6/2022</a:t>
             </a:fld>
             <a:endParaRPr lang="en-US"/>
           </a:p>
@@ -381,7 +384,7 @@
           <a:p>
             <a:fld id="{17565DFC-8168-4DE6-BB56-8CCE757EF166}" type="datetimeFigureOut">
               <a:rPr lang="en-US" smtClean="0"/>
-              <a:t>4/5/2022</a:t>
+              <a:t>4/6/2022</a:t>
             </a:fld>
             <a:endParaRPr lang="en-US"/>
           </a:p>
@@ -891,6 +894,414 @@
 </p:notes>
 </file>
 
+<file path=ppt/notesSlides/notesSlide11.xml><?xml version="1.0" encoding="utf-8"?>
+<p:notes xmlns:a="http://schemas.openxmlformats.org/drawingml/2006/main" xmlns:r="http://schemas.openxmlformats.org/officeDocument/2006/relationships" xmlns:p="http://schemas.openxmlformats.org/presentationml/2006/main">
+  <p:cSld>
+    <p:spTree>
+      <p:nvGrpSpPr>
+        <p:cNvPr id="1" name=""/>
+        <p:cNvGrpSpPr/>
+        <p:nvPr/>
+      </p:nvGrpSpPr>
+      <p:grpSpPr>
+        <a:xfrm>
+          <a:off x="0" y="0"/>
+          <a:ext cx="0" cy="0"/>
+          <a:chOff x="0" y="0"/>
+          <a:chExt cx="0" cy="0"/>
+        </a:xfrm>
+      </p:grpSpPr>
+      <p:sp>
+        <p:nvSpPr>
+          <p:cNvPr id="2" name="Slide Image Placeholder 1"/>
+          <p:cNvSpPr>
+            <a:spLocks noGrp="1" noRot="1" noChangeAspect="1"/>
+          </p:cNvSpPr>
+          <p:nvPr>
+            <p:ph type="sldImg"/>
+          </p:nvPr>
+        </p:nvSpPr>
+        <p:spPr/>
+      </p:sp>
+      <p:sp>
+        <p:nvSpPr>
+          <p:cNvPr id="3" name="Notes Placeholder 2"/>
+          <p:cNvSpPr>
+            <a:spLocks noGrp="1"/>
+          </p:cNvSpPr>
+          <p:nvPr>
+            <p:ph type="body" idx="1"/>
+          </p:nvPr>
+        </p:nvSpPr>
+        <p:spPr/>
+        <p:txBody>
+          <a:bodyPr/>
+          <a:lstStyle/>
+          <a:p>
+            <a:r>
+              <a:rPr lang="en-US" dirty="0" smtClean="0"/>
+              <a:t>#add </a:t>
+            </a:r>
+          </a:p>
+          <a:p>
+            <a:r>
+              <a:rPr lang="en-US" dirty="0" err="1" smtClean="0"/>
+              <a:t>Rstudio</a:t>
+            </a:r>
+            <a:r>
+              <a:rPr lang="en-US" baseline="0" dirty="0" smtClean="0"/>
+              <a:t> – new project – version control (assume </a:t>
+            </a:r>
+            <a:r>
+              <a:rPr lang="en-US" baseline="0" dirty="0" err="1" smtClean="0"/>
+              <a:t>git</a:t>
+            </a:r>
+            <a:r>
+              <a:rPr lang="en-US" baseline="0" dirty="0" smtClean="0"/>
+              <a:t> installed) – </a:t>
+            </a:r>
+            <a:r>
+              <a:rPr lang="en-US" baseline="0" dirty="0" err="1" smtClean="0"/>
+              <a:t>git</a:t>
+            </a:r>
+            <a:r>
+              <a:rPr lang="en-US" baseline="0" dirty="0" smtClean="0"/>
+              <a:t> – add info –create project</a:t>
+            </a:r>
+          </a:p>
+          <a:p>
+            <a:r>
+              <a:rPr lang="en-US" dirty="0" smtClean="0"/>
+              <a:t>Commit</a:t>
+            </a:r>
+            <a:r>
+              <a:rPr lang="en-US" baseline="0" dirty="0" smtClean="0"/>
+              <a:t> – add commit message – push (green arrow, terminal </a:t>
+            </a:r>
+            <a:r>
+              <a:rPr lang="en-US" baseline="0" dirty="0" err="1" smtClean="0"/>
+              <a:t>git</a:t>
+            </a:r>
+            <a:r>
+              <a:rPr lang="en-US" baseline="0" dirty="0" smtClean="0"/>
+              <a:t> push master)</a:t>
+            </a:r>
+            <a:endParaRPr lang="en-US" dirty="0"/>
+          </a:p>
+        </p:txBody>
+      </p:sp>
+      <p:sp>
+        <p:nvSpPr>
+          <p:cNvPr id="4" name="Slide Number Placeholder 3"/>
+          <p:cNvSpPr>
+            <a:spLocks noGrp="1"/>
+          </p:cNvSpPr>
+          <p:nvPr>
+            <p:ph type="sldNum" sz="quarter" idx="10"/>
+          </p:nvPr>
+        </p:nvSpPr>
+        <p:spPr/>
+        <p:txBody>
+          <a:bodyPr/>
+          <a:lstStyle/>
+          <a:p>
+            <a:fld id="{F6075E4F-4EE8-4477-BD93-32977E8FFBBF}" type="slidenum">
+              <a:rPr lang="en-US" smtClean="0"/>
+              <a:t>15</a:t>
+            </a:fld>
+            <a:endParaRPr lang="en-US"/>
+          </a:p>
+        </p:txBody>
+      </p:sp>
+    </p:spTree>
+    <p:extLst>
+      <p:ext uri="{BB962C8B-B14F-4D97-AF65-F5344CB8AC3E}">
+        <p14:creationId xmlns:p14="http://schemas.microsoft.com/office/powerpoint/2010/main" val="657169306"/>
+      </p:ext>
+    </p:extLst>
+  </p:cSld>
+  <p:clrMapOvr>
+    <a:masterClrMapping/>
+  </p:clrMapOvr>
+</p:notes>
+</file>
+
+<file path=ppt/notesSlides/notesSlide12.xml><?xml version="1.0" encoding="utf-8"?>
+<p:notes xmlns:a="http://schemas.openxmlformats.org/drawingml/2006/main" xmlns:r="http://schemas.openxmlformats.org/officeDocument/2006/relationships" xmlns:p="http://schemas.openxmlformats.org/presentationml/2006/main">
+  <p:cSld>
+    <p:spTree>
+      <p:nvGrpSpPr>
+        <p:cNvPr id="1" name=""/>
+        <p:cNvGrpSpPr/>
+        <p:nvPr/>
+      </p:nvGrpSpPr>
+      <p:grpSpPr>
+        <a:xfrm>
+          <a:off x="0" y="0"/>
+          <a:ext cx="0" cy="0"/>
+          <a:chOff x="0" y="0"/>
+          <a:chExt cx="0" cy="0"/>
+        </a:xfrm>
+      </p:grpSpPr>
+      <p:sp>
+        <p:nvSpPr>
+          <p:cNvPr id="2" name="Slide Image Placeholder 1"/>
+          <p:cNvSpPr>
+            <a:spLocks noGrp="1" noRot="1" noChangeAspect="1"/>
+          </p:cNvSpPr>
+          <p:nvPr>
+            <p:ph type="sldImg"/>
+          </p:nvPr>
+        </p:nvSpPr>
+        <p:spPr/>
+      </p:sp>
+      <p:sp>
+        <p:nvSpPr>
+          <p:cNvPr id="3" name="Notes Placeholder 2"/>
+          <p:cNvSpPr>
+            <a:spLocks noGrp="1"/>
+          </p:cNvSpPr>
+          <p:nvPr>
+            <p:ph type="body" idx="1"/>
+          </p:nvPr>
+        </p:nvSpPr>
+        <p:spPr/>
+        <p:txBody>
+          <a:bodyPr/>
+          <a:lstStyle/>
+          <a:p>
+            <a:r>
+              <a:rPr lang="en-US" sz="1200" b="0" i="0" kern="1200" dirty="0" smtClean="0">
+                <a:solidFill>
+                  <a:schemeClr val="tx1"/>
+                </a:solidFill>
+                <a:effectLst/>
+                <a:latin typeface="+mn-lt"/>
+                <a:ea typeface="+mn-ea"/>
+                <a:cs typeface="+mn-cs"/>
+              </a:rPr>
+              <a:t>As a guideline, commit parts of code intended for a specific change.</a:t>
+            </a:r>
+            <a:endParaRPr lang="en-US" dirty="0" smtClean="0"/>
+          </a:p>
+          <a:p>
+            <a:r>
+              <a:rPr lang="en-US" dirty="0" smtClean="0"/>
+              <a:t>Commit change and add commit message</a:t>
+            </a:r>
+          </a:p>
+          <a:p>
+            <a:pPr lvl="1"/>
+            <a:r>
+              <a:rPr lang="en-US" dirty="0" smtClean="0"/>
+              <a:t>Short but descriptive</a:t>
+            </a:r>
+          </a:p>
+          <a:p>
+            <a:r>
+              <a:rPr lang="en-US" dirty="0" smtClean="0"/>
+              <a:t>Push changes to repository</a:t>
+            </a:r>
+          </a:p>
+          <a:p>
+            <a:pPr lvl="1"/>
+            <a:r>
+              <a:rPr lang="en-US" dirty="0" smtClean="0"/>
+              <a:t>Choose which branch to push to</a:t>
+            </a:r>
+          </a:p>
+          <a:p>
+            <a:pPr lvl="1"/>
+            <a:r>
+              <a:rPr lang="en-US" dirty="0" smtClean="0"/>
+              <a:t>Can push multiple commits at once</a:t>
+            </a:r>
+          </a:p>
+          <a:p>
+            <a:r>
+              <a:rPr lang="en-US" dirty="0" smtClean="0"/>
+              <a:t>Pull before starting a new session to make sure you have the most updated version</a:t>
+            </a:r>
+          </a:p>
+          <a:p>
+            <a:endParaRPr lang="en-US" dirty="0"/>
+          </a:p>
+        </p:txBody>
+      </p:sp>
+      <p:sp>
+        <p:nvSpPr>
+          <p:cNvPr id="4" name="Slide Number Placeholder 3"/>
+          <p:cNvSpPr>
+            <a:spLocks noGrp="1"/>
+          </p:cNvSpPr>
+          <p:nvPr>
+            <p:ph type="sldNum" sz="quarter" idx="10"/>
+          </p:nvPr>
+        </p:nvSpPr>
+        <p:spPr/>
+        <p:txBody>
+          <a:bodyPr/>
+          <a:lstStyle/>
+          <a:p>
+            <a:fld id="{F6075E4F-4EE8-4477-BD93-32977E8FFBBF}" type="slidenum">
+              <a:rPr lang="en-US" smtClean="0"/>
+              <a:t>16</a:t>
+            </a:fld>
+            <a:endParaRPr lang="en-US"/>
+          </a:p>
+        </p:txBody>
+      </p:sp>
+    </p:spTree>
+    <p:extLst>
+      <p:ext uri="{BB962C8B-B14F-4D97-AF65-F5344CB8AC3E}">
+        <p14:creationId xmlns:p14="http://schemas.microsoft.com/office/powerpoint/2010/main" val="3542841790"/>
+      </p:ext>
+    </p:extLst>
+  </p:cSld>
+  <p:clrMapOvr>
+    <a:masterClrMapping/>
+  </p:clrMapOvr>
+</p:notes>
+</file>
+
+<file path=ppt/notesSlides/notesSlide13.xml><?xml version="1.0" encoding="utf-8"?>
+<p:notes xmlns:a="http://schemas.openxmlformats.org/drawingml/2006/main" xmlns:r="http://schemas.openxmlformats.org/officeDocument/2006/relationships" xmlns:p="http://schemas.openxmlformats.org/presentationml/2006/main">
+  <p:cSld>
+    <p:spTree>
+      <p:nvGrpSpPr>
+        <p:cNvPr id="1" name=""/>
+        <p:cNvGrpSpPr/>
+        <p:nvPr/>
+      </p:nvGrpSpPr>
+      <p:grpSpPr>
+        <a:xfrm>
+          <a:off x="0" y="0"/>
+          <a:ext cx="0" cy="0"/>
+          <a:chOff x="0" y="0"/>
+          <a:chExt cx="0" cy="0"/>
+        </a:xfrm>
+      </p:grpSpPr>
+      <p:sp>
+        <p:nvSpPr>
+          <p:cNvPr id="2" name="Slide Image Placeholder 1"/>
+          <p:cNvSpPr>
+            <a:spLocks noGrp="1" noRot="1" noChangeAspect="1"/>
+          </p:cNvSpPr>
+          <p:nvPr>
+            <p:ph type="sldImg"/>
+          </p:nvPr>
+        </p:nvSpPr>
+        <p:spPr/>
+      </p:sp>
+      <p:sp>
+        <p:nvSpPr>
+          <p:cNvPr id="3" name="Notes Placeholder 2"/>
+          <p:cNvSpPr>
+            <a:spLocks noGrp="1"/>
+          </p:cNvSpPr>
+          <p:nvPr>
+            <p:ph type="body" idx="1"/>
+          </p:nvPr>
+        </p:nvSpPr>
+        <p:spPr/>
+        <p:txBody>
+          <a:bodyPr/>
+          <a:lstStyle/>
+          <a:p>
+            <a:r>
+              <a:rPr lang="en-US" sz="1200" b="0" i="0" kern="1200" dirty="0" smtClean="0">
+                <a:solidFill>
+                  <a:schemeClr val="tx1"/>
+                </a:solidFill>
+                <a:effectLst/>
+                <a:latin typeface="+mn-lt"/>
+                <a:ea typeface="+mn-ea"/>
+                <a:cs typeface="+mn-cs"/>
+              </a:rPr>
+              <a:t>As a guideline, commit parts of code intended for a specific change.</a:t>
+            </a:r>
+            <a:endParaRPr lang="en-US" dirty="0" smtClean="0"/>
+          </a:p>
+          <a:p>
+            <a:r>
+              <a:rPr lang="en-US" dirty="0" smtClean="0"/>
+              <a:t>Commit change and add commit message</a:t>
+            </a:r>
+          </a:p>
+          <a:p>
+            <a:pPr lvl="1"/>
+            <a:r>
+              <a:rPr lang="en-US" dirty="0" smtClean="0"/>
+              <a:t>Short but descriptive</a:t>
+            </a:r>
+          </a:p>
+          <a:p>
+            <a:r>
+              <a:rPr lang="en-US" dirty="0" smtClean="0"/>
+              <a:t>Push changes to repository</a:t>
+            </a:r>
+          </a:p>
+          <a:p>
+            <a:pPr lvl="1"/>
+            <a:r>
+              <a:rPr lang="en-US" dirty="0" smtClean="0"/>
+              <a:t>Choose which branch to push to</a:t>
+            </a:r>
+          </a:p>
+          <a:p>
+            <a:pPr lvl="1"/>
+            <a:r>
+              <a:rPr lang="en-US" dirty="0" smtClean="0"/>
+              <a:t>Can push multiple commits at once</a:t>
+            </a:r>
+          </a:p>
+          <a:p>
+            <a:r>
+              <a:rPr lang="en-US" dirty="0" smtClean="0"/>
+              <a:t>Pull before starting a new session to make sure you have the most updated version</a:t>
+            </a:r>
+          </a:p>
+          <a:p>
+            <a:endParaRPr lang="en-US" dirty="0"/>
+          </a:p>
+        </p:txBody>
+      </p:sp>
+      <p:sp>
+        <p:nvSpPr>
+          <p:cNvPr id="4" name="Slide Number Placeholder 3"/>
+          <p:cNvSpPr>
+            <a:spLocks noGrp="1"/>
+          </p:cNvSpPr>
+          <p:nvPr>
+            <p:ph type="sldNum" sz="quarter" idx="10"/>
+          </p:nvPr>
+        </p:nvSpPr>
+        <p:spPr/>
+        <p:txBody>
+          <a:bodyPr/>
+          <a:lstStyle/>
+          <a:p>
+            <a:fld id="{F6075E4F-4EE8-4477-BD93-32977E8FFBBF}" type="slidenum">
+              <a:rPr lang="en-US" smtClean="0"/>
+              <a:t>17</a:t>
+            </a:fld>
+            <a:endParaRPr lang="en-US"/>
+          </a:p>
+        </p:txBody>
+      </p:sp>
+    </p:spTree>
+    <p:extLst>
+      <p:ext uri="{BB962C8B-B14F-4D97-AF65-F5344CB8AC3E}">
+        <p14:creationId xmlns:p14="http://schemas.microsoft.com/office/powerpoint/2010/main" val="1426809097"/>
+      </p:ext>
+    </p:extLst>
+  </p:cSld>
+  <p:clrMapOvr>
+    <a:masterClrMapping/>
+  </p:clrMapOvr>
+</p:notes>
+</file>
+
 <file path=ppt/notesSlides/notesSlide2.xml><?xml version="1.0" encoding="utf-8"?>
 <p:notes xmlns:a="http://schemas.openxmlformats.org/drawingml/2006/main" xmlns:r="http://schemas.openxmlformats.org/officeDocument/2006/relationships" xmlns:p="http://schemas.openxmlformats.org/presentationml/2006/main">
   <p:cSld>
@@ -1054,11 +1465,7 @@
             <a:pPr lvl="1"/>
             <a:r>
               <a:rPr lang="en-US" sz="1400" dirty="0" smtClean="0"/>
-              <a:t>License.md (legal license for the repo, especially important for packages</a:t>
-            </a:r>
-            <a:r>
-              <a:rPr lang="en-US" sz="1400" dirty="0" smtClean="0"/>
-              <a:t>) – make it</a:t>
+              <a:t>License.md (legal license for the repo, especially important for packages) – make it</a:t>
             </a:r>
             <a:r>
               <a:rPr lang="en-US" sz="1400" baseline="0" dirty="0" smtClean="0"/>
@@ -1300,11 +1707,7 @@
           <a:p>
             <a:r>
               <a:rPr lang="en-US" dirty="0" smtClean="0"/>
-              <a:t>Commit </a:t>
-            </a:r>
-            <a:r>
-              <a:rPr lang="en-US" dirty="0" smtClean="0"/>
-              <a:t>change and add commit message</a:t>
+              <a:t>Commit change and add commit message</a:t>
             </a:r>
           </a:p>
           <a:p>
@@ -1720,7 +2123,6 @@
               <a:rPr lang="en-US" baseline="0" dirty="0" smtClean="0"/>
               <a:t> set this up, go to settings and Pages on the left hand panel, then select the branch you want to be the main page and which branch. </a:t>
             </a:r>
-            <a:endParaRPr lang="en-US" baseline="0" dirty="0" smtClean="0"/>
           </a:p>
           <a:p>
             <a:r>
@@ -2041,7 +2443,7 @@
           <a:p>
             <a:fld id="{56C85CB4-DB76-4442-9A43-AE556D77ADB1}" type="datetime1">
               <a:rPr lang="en-US" smtClean="0"/>
-              <a:t>4/5/2022</a:t>
+              <a:t>4/6/2022</a:t>
             </a:fld>
             <a:endParaRPr lang="en-US" dirty="0"/>
           </a:p>
@@ -2212,7 +2614,7 @@
           <a:p>
             <a:fld id="{BCD63DF2-C253-4205-867C-60420319D43A}" type="datetime1">
               <a:rPr lang="en-US" smtClean="0"/>
-              <a:t>4/5/2022</a:t>
+              <a:t>4/6/2022</a:t>
             </a:fld>
             <a:endParaRPr lang="en-US"/>
           </a:p>
@@ -2392,7 +2794,7 @@
           <a:p>
             <a:fld id="{F668C1BF-5A24-49C9-9735-DE6E442F4DE0}" type="datetime1">
               <a:rPr lang="en-US" smtClean="0"/>
-              <a:t>4/5/2022</a:t>
+              <a:t>4/6/2022</a:t>
             </a:fld>
             <a:endParaRPr lang="en-US"/>
           </a:p>
@@ -2858,7 +3260,7 @@
           <a:p>
             <a:fld id="{85CFCC4A-4D1E-4F35-9929-A051B58E0F9D}" type="datetime1">
               <a:rPr lang="en-US" smtClean="0"/>
-              <a:t>4/5/2022</a:t>
+              <a:t>4/6/2022</a:t>
             </a:fld>
             <a:endParaRPr lang="en-US"/>
           </a:p>
@@ -3088,7 +3490,7 @@
           <a:p>
             <a:fld id="{56C85CB4-DB76-4442-9A43-AE556D77ADB1}" type="datetime1">
               <a:rPr lang="en-US" smtClean="0"/>
-              <a:t>4/5/2022</a:t>
+              <a:t>4/6/2022</a:t>
             </a:fld>
             <a:endParaRPr lang="en-US" dirty="0"/>
           </a:p>
@@ -3335,7 +3737,7 @@
           <a:p>
             <a:fld id="{263BCDFF-5CDF-4F9B-9E39-06A21E1200C8}" type="datetime1">
               <a:rPr lang="en-US" smtClean="0"/>
-              <a:t>4/5/2022</a:t>
+              <a:t>4/6/2022</a:t>
             </a:fld>
             <a:endParaRPr lang="en-US"/>
           </a:p>
@@ -3567,7 +3969,7 @@
           <a:p>
             <a:fld id="{85CFCC4A-4D1E-4F35-9929-A051B58E0F9D}" type="datetime1">
               <a:rPr lang="en-US" smtClean="0"/>
-              <a:t>4/5/2022</a:t>
+              <a:t>4/6/2022</a:t>
             </a:fld>
             <a:endParaRPr lang="en-US"/>
           </a:p>
@@ -3935,7 +4337,7 @@
           <a:p>
             <a:fld id="{9CE4358E-32CF-40E2-8FA2-E626B96E40DC}" type="datetime1">
               <a:rPr lang="en-US" smtClean="0"/>
-              <a:t>4/5/2022</a:t>
+              <a:t>4/6/2022</a:t>
             </a:fld>
             <a:endParaRPr lang="en-US"/>
           </a:p>
@@ -4053,7 +4455,7 @@
           <a:p>
             <a:fld id="{BFA801A8-7517-453A-A153-9CD48DB2B92A}" type="datetime1">
               <a:rPr lang="en-US" smtClean="0"/>
-              <a:t>4/5/2022</a:t>
+              <a:t>4/6/2022</a:t>
             </a:fld>
             <a:endParaRPr lang="en-US"/>
           </a:p>
@@ -4148,7 +4550,7 @@
           <a:p>
             <a:fld id="{F80F1DEE-622D-4659-A56F-B16AB5771332}" type="datetime1">
               <a:rPr lang="en-US" smtClean="0"/>
-              <a:t>4/5/2022</a:t>
+              <a:t>4/6/2022</a:t>
             </a:fld>
             <a:endParaRPr lang="en-US"/>
           </a:p>
@@ -4425,7 +4827,7 @@
           <a:p>
             <a:fld id="{D4F55DC5-8E1B-4EEA-8280-13C94BA0C35F}" type="datetime1">
               <a:rPr lang="en-US" smtClean="0"/>
-              <a:t>4/5/2022</a:t>
+              <a:t>4/6/2022</a:t>
             </a:fld>
             <a:endParaRPr lang="en-US"/>
           </a:p>
@@ -4678,7 +5080,7 @@
           <a:p>
             <a:fld id="{A621C3C6-68AC-44FD-ACED-67B791FE6CCF}" type="datetime1">
               <a:rPr lang="en-US" smtClean="0"/>
-              <a:t>4/5/2022</a:t>
+              <a:t>4/6/2022</a:t>
             </a:fld>
             <a:endParaRPr lang="en-US"/>
           </a:p>
@@ -4891,7 +5293,7 @@
           <a:p>
             <a:fld id="{E655DCC5-4CF7-4C95-95FF-704B39D7A6AF}" type="datetime1">
               <a:rPr lang="en-US" smtClean="0"/>
-              <a:t>4/5/2022</a:t>
+              <a:t>4/6/2022</a:t>
             </a:fld>
             <a:endParaRPr lang="en-US"/>
           </a:p>
@@ -8884,6 +9286,1843 @@
 </p:sld>
 </file>
 
+<file path=ppt/slides/slide15.xml><?xml version="1.0" encoding="utf-8"?>
+<p:sld xmlns:a="http://schemas.openxmlformats.org/drawingml/2006/main" xmlns:r="http://schemas.openxmlformats.org/officeDocument/2006/relationships" xmlns:p="http://schemas.openxmlformats.org/presentationml/2006/main">
+  <p:cSld>
+    <p:spTree>
+      <p:nvGrpSpPr>
+        <p:cNvPr id="1" name=""/>
+        <p:cNvGrpSpPr/>
+        <p:nvPr/>
+      </p:nvGrpSpPr>
+      <p:grpSpPr>
+        <a:xfrm>
+          <a:off x="0" y="0"/>
+          <a:ext cx="0" cy="0"/>
+          <a:chOff x="0" y="0"/>
+          <a:chExt cx="0" cy="0"/>
+        </a:xfrm>
+      </p:grpSpPr>
+      <p:pic>
+        <p:nvPicPr>
+          <p:cNvPr id="3" name="Picture 2"/>
+          <p:cNvPicPr>
+            <a:picLocks noChangeAspect="1"/>
+          </p:cNvPicPr>
+          <p:nvPr/>
+        </p:nvPicPr>
+        <p:blipFill>
+          <a:blip r:embed="rId3" cstate="print">
+            <a:extLst>
+              <a:ext uri="{28A0092B-C50C-407E-A947-70E740481C1C}">
+                <a14:useLocalDpi xmlns:a14="http://schemas.microsoft.com/office/drawing/2010/main" val="0"/>
+              </a:ext>
+            </a:extLst>
+          </a:blip>
+          <a:stretch>
+            <a:fillRect/>
+          </a:stretch>
+        </p:blipFill>
+        <p:spPr>
+          <a:xfrm>
+            <a:off x="5084681" y="1377209"/>
+            <a:ext cx="6397767" cy="3527076"/>
+          </a:xfrm>
+          <a:prstGeom prst="rect">
+            <a:avLst/>
+          </a:prstGeom>
+        </p:spPr>
+      </p:pic>
+      <p:sp>
+        <p:nvSpPr>
+          <p:cNvPr id="2" name="Title 1"/>
+          <p:cNvSpPr>
+            <a:spLocks noGrp="1"/>
+          </p:cNvSpPr>
+          <p:nvPr>
+            <p:ph type="title"/>
+          </p:nvPr>
+        </p:nvSpPr>
+        <p:spPr/>
+        <p:txBody>
+          <a:bodyPr>
+            <a:normAutofit/>
+          </a:bodyPr>
+          <a:lstStyle/>
+          <a:p>
+            <a:r>
+              <a:rPr lang="en-US" sz="3600" dirty="0" smtClean="0">
+                <a:solidFill>
+                  <a:srgbClr val="4C566A"/>
+                </a:solidFill>
+                <a:latin typeface="Red Hat Mono Medium" panose="02010309040201060303" pitchFamily="49" charset="0"/>
+                <a:ea typeface="Red Hat Mono Medium" panose="02010309040201060303" pitchFamily="49" charset="0"/>
+                <a:cs typeface="Red Hat Mono Medium" panose="02010309040201060303" pitchFamily="49" charset="0"/>
+              </a:rPr>
+              <a:t>Step 2: Clone Repository to Machine (</a:t>
+            </a:r>
+            <a:r>
+              <a:rPr lang="en-US" sz="3600" dirty="0" err="1" smtClean="0">
+                <a:solidFill>
+                  <a:srgbClr val="4C566A"/>
+                </a:solidFill>
+                <a:latin typeface="Red Hat Mono Medium" panose="02010309040201060303" pitchFamily="49" charset="0"/>
+                <a:ea typeface="Red Hat Mono Medium" panose="02010309040201060303" pitchFamily="49" charset="0"/>
+                <a:cs typeface="Red Hat Mono Medium" panose="02010309040201060303" pitchFamily="49" charset="0"/>
+              </a:rPr>
+              <a:t>Rstudio</a:t>
+            </a:r>
+            <a:r>
+              <a:rPr lang="en-US" sz="3600" dirty="0" smtClean="0">
+                <a:solidFill>
+                  <a:srgbClr val="4C566A"/>
+                </a:solidFill>
+                <a:latin typeface="Red Hat Mono Medium" panose="02010309040201060303" pitchFamily="49" charset="0"/>
+                <a:ea typeface="Red Hat Mono Medium" panose="02010309040201060303" pitchFamily="49" charset="0"/>
+                <a:cs typeface="Red Hat Mono Medium" panose="02010309040201060303" pitchFamily="49" charset="0"/>
+              </a:rPr>
+              <a:t>)</a:t>
+            </a:r>
+            <a:endParaRPr lang="en-US" sz="3600" dirty="0">
+              <a:solidFill>
+                <a:srgbClr val="4C566A"/>
+              </a:solidFill>
+              <a:latin typeface="Red Hat Mono Medium" panose="02010309040201060303" pitchFamily="49" charset="0"/>
+              <a:ea typeface="Red Hat Mono Medium" panose="02010309040201060303" pitchFamily="49" charset="0"/>
+              <a:cs typeface="Red Hat Mono Medium" panose="02010309040201060303" pitchFamily="49" charset="0"/>
+            </a:endParaRPr>
+          </a:p>
+        </p:txBody>
+      </p:sp>
+      <p:pic>
+        <p:nvPicPr>
+          <p:cNvPr id="5" name="Content Placeholder 4"/>
+          <p:cNvPicPr>
+            <a:picLocks noGrp="1" noChangeAspect="1"/>
+          </p:cNvPicPr>
+          <p:nvPr>
+            <p:ph idx="1"/>
+          </p:nvPr>
+        </p:nvPicPr>
+        <p:blipFill>
+          <a:blip r:embed="rId4" cstate="print">
+            <a:extLst>
+              <a:ext uri="{28A0092B-C50C-407E-A947-70E740481C1C}">
+                <a14:useLocalDpi xmlns:a14="http://schemas.microsoft.com/office/drawing/2010/main" val="0"/>
+              </a:ext>
+            </a:extLst>
+          </a:blip>
+          <a:stretch>
+            <a:fillRect/>
+          </a:stretch>
+        </p:blipFill>
+        <p:spPr>
+          <a:xfrm>
+            <a:off x="356908" y="2279617"/>
+            <a:ext cx="5078506" cy="3335086"/>
+          </a:xfrm>
+          <a:prstGeom prst="roundRect">
+            <a:avLst>
+              <a:gd name="adj" fmla="val 2101"/>
+            </a:avLst>
+          </a:prstGeom>
+          <a:ln>
+            <a:solidFill>
+              <a:srgbClr val="ECEFF4"/>
+            </a:solidFill>
+          </a:ln>
+          <a:effectLst>
+            <a:outerShdw blurRad="50800" dist="38100" dir="5400000" algn="t" rotWithShape="0">
+              <a:srgbClr val="D8DEE9">
+                <a:alpha val="49000"/>
+              </a:srgbClr>
+            </a:outerShdw>
+          </a:effectLst>
+        </p:spPr>
+      </p:pic>
+      <p:sp>
+        <p:nvSpPr>
+          <p:cNvPr id="4" name="Slide Number Placeholder 3"/>
+          <p:cNvSpPr>
+            <a:spLocks noGrp="1"/>
+          </p:cNvSpPr>
+          <p:nvPr>
+            <p:ph type="sldNum" sz="quarter" idx="12"/>
+          </p:nvPr>
+        </p:nvSpPr>
+        <p:spPr/>
+        <p:txBody>
+          <a:bodyPr/>
+          <a:lstStyle/>
+          <a:p>
+            <a:fld id="{FE38431A-A5B3-46BF-BFD7-42EAB7F5F465}" type="slidenum">
+              <a:rPr lang="en-US" smtClean="0"/>
+              <a:pPr/>
+              <a:t>15</a:t>
+            </a:fld>
+            <a:endParaRPr lang="en-US"/>
+          </a:p>
+        </p:txBody>
+      </p:sp>
+      <p:sp>
+        <p:nvSpPr>
+          <p:cNvPr id="7" name="Rounded Rectangle 6"/>
+          <p:cNvSpPr/>
+          <p:nvPr/>
+        </p:nvSpPr>
+        <p:spPr>
+          <a:xfrm>
+            <a:off x="7484962" y="2805180"/>
+            <a:ext cx="2226197" cy="131180"/>
+          </a:xfrm>
+          <a:prstGeom prst="roundRect">
+            <a:avLst>
+              <a:gd name="adj" fmla="val 4902"/>
+            </a:avLst>
+          </a:prstGeom>
+          <a:solidFill>
+            <a:srgbClr val="EBCB8B">
+              <a:alpha val="30980"/>
+            </a:srgbClr>
+          </a:solidFill>
+          <a:ln>
+            <a:solidFill>
+              <a:srgbClr val="EBCB8B"/>
+            </a:solidFill>
+          </a:ln>
+        </p:spPr>
+        <p:style>
+          <a:lnRef idx="2">
+            <a:schemeClr val="accent1">
+              <a:shade val="50000"/>
+            </a:schemeClr>
+          </a:lnRef>
+          <a:fillRef idx="1">
+            <a:schemeClr val="accent1"/>
+          </a:fillRef>
+          <a:effectRef idx="0">
+            <a:schemeClr val="accent1"/>
+          </a:effectRef>
+          <a:fontRef idx="minor">
+            <a:schemeClr val="lt1"/>
+          </a:fontRef>
+        </p:style>
+        <p:txBody>
+          <a:bodyPr rtlCol="0" anchor="ctr"/>
+          <a:lstStyle/>
+          <a:p>
+            <a:pPr algn="ctr"/>
+            <a:endParaRPr lang="en-US"/>
+          </a:p>
+        </p:txBody>
+      </p:sp>
+      <p:sp>
+        <p:nvSpPr>
+          <p:cNvPr id="9" name="Rounded Rectangle 8"/>
+          <p:cNvSpPr/>
+          <p:nvPr/>
+        </p:nvSpPr>
+        <p:spPr>
+          <a:xfrm>
+            <a:off x="2584579" y="3297287"/>
+            <a:ext cx="1153611" cy="103575"/>
+          </a:xfrm>
+          <a:prstGeom prst="roundRect">
+            <a:avLst>
+              <a:gd name="adj" fmla="val 4902"/>
+            </a:avLst>
+          </a:prstGeom>
+          <a:solidFill>
+            <a:srgbClr val="EBCB8B">
+              <a:alpha val="30980"/>
+            </a:srgbClr>
+          </a:solidFill>
+          <a:ln>
+            <a:solidFill>
+              <a:srgbClr val="EBCB8B"/>
+            </a:solidFill>
+          </a:ln>
+        </p:spPr>
+        <p:style>
+          <a:lnRef idx="2">
+            <a:schemeClr val="accent1">
+              <a:shade val="50000"/>
+            </a:schemeClr>
+          </a:lnRef>
+          <a:fillRef idx="1">
+            <a:schemeClr val="accent1"/>
+          </a:fillRef>
+          <a:effectRef idx="0">
+            <a:schemeClr val="accent1"/>
+          </a:effectRef>
+          <a:fontRef idx="minor">
+            <a:schemeClr val="lt1"/>
+          </a:fontRef>
+        </p:style>
+        <p:txBody>
+          <a:bodyPr rtlCol="0" anchor="ctr"/>
+          <a:lstStyle/>
+          <a:p>
+            <a:pPr algn="ctr"/>
+            <a:endParaRPr lang="en-US"/>
+          </a:p>
+        </p:txBody>
+      </p:sp>
+      <p:cxnSp>
+        <p:nvCxnSpPr>
+          <p:cNvPr id="23" name="Straight Arrow Connector 22"/>
+          <p:cNvCxnSpPr/>
+          <p:nvPr/>
+        </p:nvCxnSpPr>
+        <p:spPr>
+          <a:xfrm flipV="1">
+            <a:off x="3866838" y="2924538"/>
+            <a:ext cx="3529642" cy="432418"/>
+          </a:xfrm>
+          <a:prstGeom prst="straightConnector1">
+            <a:avLst/>
+          </a:prstGeom>
+          <a:ln w="57150" cap="rnd">
+            <a:solidFill>
+              <a:srgbClr val="B48EAD"/>
+            </a:solidFill>
+            <a:tailEnd type="triangle"/>
+          </a:ln>
+        </p:spPr>
+        <p:style>
+          <a:lnRef idx="1">
+            <a:schemeClr val="accent1"/>
+          </a:lnRef>
+          <a:fillRef idx="0">
+            <a:schemeClr val="accent1"/>
+          </a:fillRef>
+          <a:effectRef idx="0">
+            <a:schemeClr val="accent1"/>
+          </a:effectRef>
+          <a:fontRef idx="minor">
+            <a:schemeClr val="tx1"/>
+          </a:fontRef>
+        </p:style>
+      </p:cxnSp>
+      <p:sp>
+        <p:nvSpPr>
+          <p:cNvPr id="26" name="Rounded Rectangle 25"/>
+          <p:cNvSpPr/>
+          <p:nvPr/>
+        </p:nvSpPr>
+        <p:spPr>
+          <a:xfrm>
+            <a:off x="8610600" y="4155898"/>
+            <a:ext cx="782320" cy="268781"/>
+          </a:xfrm>
+          <a:prstGeom prst="roundRect">
+            <a:avLst>
+              <a:gd name="adj" fmla="val 0"/>
+            </a:avLst>
+          </a:prstGeom>
+          <a:noFill/>
+          <a:ln w="57150">
+            <a:solidFill>
+              <a:srgbClr val="B48EAD"/>
+            </a:solidFill>
+          </a:ln>
+        </p:spPr>
+        <p:style>
+          <a:lnRef idx="2">
+            <a:schemeClr val="accent1">
+              <a:shade val="50000"/>
+            </a:schemeClr>
+          </a:lnRef>
+          <a:fillRef idx="1">
+            <a:schemeClr val="accent1"/>
+          </a:fillRef>
+          <a:effectRef idx="0">
+            <a:schemeClr val="accent1"/>
+          </a:effectRef>
+          <a:fontRef idx="minor">
+            <a:schemeClr val="lt1"/>
+          </a:fontRef>
+        </p:style>
+        <p:txBody>
+          <a:bodyPr rtlCol="0" anchor="ctr"/>
+          <a:lstStyle/>
+          <a:p>
+            <a:pPr algn="ctr"/>
+            <a:endParaRPr lang="en-US"/>
+          </a:p>
+        </p:txBody>
+      </p:sp>
+      <p:sp>
+        <p:nvSpPr>
+          <p:cNvPr id="8" name="TextBox 7"/>
+          <p:cNvSpPr txBox="1"/>
+          <p:nvPr/>
+        </p:nvSpPr>
+        <p:spPr>
+          <a:xfrm>
+            <a:off x="3759062" y="1149307"/>
+            <a:ext cx="7451799" cy="369332"/>
+          </a:xfrm>
+          <a:prstGeom prst="rect">
+            <a:avLst/>
+          </a:prstGeom>
+          <a:noFill/>
+        </p:spPr>
+        <p:txBody>
+          <a:bodyPr wrap="square" rtlCol="0">
+            <a:spAutoFit/>
+          </a:bodyPr>
+          <a:lstStyle/>
+          <a:p>
+            <a:r>
+              <a:rPr lang="en-US" dirty="0" smtClean="0">
+                <a:latin typeface="Consolas" panose="020B0609020204030204" pitchFamily="49" charset="0"/>
+              </a:rPr>
+              <a:t>New Project (Create Project) -&gt; Version Control -&gt; </a:t>
+            </a:r>
+            <a:r>
+              <a:rPr lang="en-US" dirty="0" err="1" smtClean="0">
+                <a:latin typeface="Consolas" panose="020B0609020204030204" pitchFamily="49" charset="0"/>
+              </a:rPr>
+              <a:t>Git</a:t>
+            </a:r>
+            <a:r>
+              <a:rPr lang="en-US" dirty="0">
+                <a:latin typeface="Consolas" panose="020B0609020204030204" pitchFamily="49" charset="0"/>
+              </a:rPr>
+              <a:t> </a:t>
+            </a:r>
+            <a:r>
+              <a:rPr lang="en-US" dirty="0" smtClean="0">
+                <a:latin typeface="Consolas" panose="020B0609020204030204" pitchFamily="49" charset="0"/>
+              </a:rPr>
+              <a:t>-&gt;</a:t>
+            </a:r>
+            <a:endParaRPr lang="en-US" dirty="0">
+              <a:latin typeface="Consolas" panose="020B0609020204030204" pitchFamily="49" charset="0"/>
+            </a:endParaRPr>
+          </a:p>
+        </p:txBody>
+      </p:sp>
+    </p:spTree>
+    <p:extLst>
+      <p:ext uri="{BB962C8B-B14F-4D97-AF65-F5344CB8AC3E}">
+        <p14:creationId xmlns:p14="http://schemas.microsoft.com/office/powerpoint/2010/main" val="536613341"/>
+      </p:ext>
+    </p:extLst>
+  </p:cSld>
+  <p:clrMapOvr>
+    <a:masterClrMapping/>
+  </p:clrMapOvr>
+  <p:timing>
+    <p:tnLst>
+      <p:par>
+        <p:cTn id="1" dur="indefinite" restart="never" nodeType="tmRoot">
+          <p:childTnLst>
+            <p:seq concurrent="1" nextAc="seek">
+              <p:cTn id="2" dur="indefinite" nodeType="mainSeq">
+                <p:childTnLst>
+                  <p:par>
+                    <p:cTn id="3" fill="hold">
+                      <p:stCondLst>
+                        <p:cond delay="indefinite"/>
+                        <p:cond evt="onBegin" delay="0">
+                          <p:tn val="2"/>
+                        </p:cond>
+                      </p:stCondLst>
+                      <p:childTnLst>
+                        <p:par>
+                          <p:cTn id="4" fill="hold">
+                            <p:stCondLst>
+                              <p:cond delay="0"/>
+                            </p:stCondLst>
+                            <p:childTnLst>
+                              <p:par>
+                                <p:cTn id="5" presetID="10" presetClass="entr" presetSubtype="0" fill="hold" grpId="0" nodeType="withEffect">
+                                  <p:stCondLst>
+                                    <p:cond delay="0"/>
+                                  </p:stCondLst>
+                                  <p:childTnLst>
+                                    <p:set>
+                                      <p:cBhvr>
+                                        <p:cTn id="6" dur="1" fill="hold">
+                                          <p:stCondLst>
+                                            <p:cond delay="0"/>
+                                          </p:stCondLst>
+                                        </p:cTn>
+                                        <p:tgtEl>
+                                          <p:spTgt spid="26"/>
+                                        </p:tgtEl>
+                                        <p:attrNameLst>
+                                          <p:attrName>style.visibility</p:attrName>
+                                        </p:attrNameLst>
+                                      </p:cBhvr>
+                                      <p:to>
+                                        <p:strVal val="visible"/>
+                                      </p:to>
+                                    </p:set>
+                                    <p:animEffect transition="in" filter="fade">
+                                      <p:cBhvr>
+                                        <p:cTn id="7" dur="500"/>
+                                        <p:tgtEl>
+                                          <p:spTgt spid="26"/>
+                                        </p:tgtEl>
+                                      </p:cBhvr>
+                                    </p:animEffect>
+                                  </p:childTnLst>
+                                </p:cTn>
+                              </p:par>
+                            </p:childTnLst>
+                          </p:cTn>
+                        </p:par>
+                      </p:childTnLst>
+                    </p:cTn>
+                  </p:par>
+                  <p:par>
+                    <p:cTn id="8" fill="hold">
+                      <p:stCondLst>
+                        <p:cond delay="indefinite"/>
+                      </p:stCondLst>
+                      <p:childTnLst>
+                        <p:par>
+                          <p:cTn id="9" fill="hold">
+                            <p:stCondLst>
+                              <p:cond delay="0"/>
+                            </p:stCondLst>
+                            <p:childTnLst>
+                              <p:par>
+                                <p:cTn id="10" presetID="10" presetClass="entr" presetSubtype="0" fill="hold" grpId="0" nodeType="clickEffect">
+                                  <p:stCondLst>
+                                    <p:cond delay="0"/>
+                                  </p:stCondLst>
+                                  <p:childTnLst>
+                                    <p:set>
+                                      <p:cBhvr>
+                                        <p:cTn id="11" dur="1" fill="hold">
+                                          <p:stCondLst>
+                                            <p:cond delay="0"/>
+                                          </p:stCondLst>
+                                        </p:cTn>
+                                        <p:tgtEl>
+                                          <p:spTgt spid="7"/>
+                                        </p:tgtEl>
+                                        <p:attrNameLst>
+                                          <p:attrName>style.visibility</p:attrName>
+                                        </p:attrNameLst>
+                                      </p:cBhvr>
+                                      <p:to>
+                                        <p:strVal val="visible"/>
+                                      </p:to>
+                                    </p:set>
+                                    <p:animEffect transition="in" filter="fade">
+                                      <p:cBhvr>
+                                        <p:cTn id="12" dur="500"/>
+                                        <p:tgtEl>
+                                          <p:spTgt spid="7"/>
+                                        </p:tgtEl>
+                                      </p:cBhvr>
+                                    </p:animEffect>
+                                  </p:childTnLst>
+                                </p:cTn>
+                              </p:par>
+                              <p:par>
+                                <p:cTn id="13" presetID="10" presetClass="entr" presetSubtype="0" fill="hold" grpId="0" nodeType="withEffect">
+                                  <p:stCondLst>
+                                    <p:cond delay="0"/>
+                                  </p:stCondLst>
+                                  <p:childTnLst>
+                                    <p:set>
+                                      <p:cBhvr>
+                                        <p:cTn id="14" dur="1" fill="hold">
+                                          <p:stCondLst>
+                                            <p:cond delay="0"/>
+                                          </p:stCondLst>
+                                        </p:cTn>
+                                        <p:tgtEl>
+                                          <p:spTgt spid="9"/>
+                                        </p:tgtEl>
+                                        <p:attrNameLst>
+                                          <p:attrName>style.visibility</p:attrName>
+                                        </p:attrNameLst>
+                                      </p:cBhvr>
+                                      <p:to>
+                                        <p:strVal val="visible"/>
+                                      </p:to>
+                                    </p:set>
+                                    <p:animEffect transition="in" filter="fade">
+                                      <p:cBhvr>
+                                        <p:cTn id="15" dur="500"/>
+                                        <p:tgtEl>
+                                          <p:spTgt spid="9"/>
+                                        </p:tgtEl>
+                                      </p:cBhvr>
+                                    </p:animEffect>
+                                  </p:childTnLst>
+                                </p:cTn>
+                              </p:par>
+                              <p:par>
+                                <p:cTn id="16" presetID="10" presetClass="entr" presetSubtype="0" fill="hold" nodeType="withEffect">
+                                  <p:stCondLst>
+                                    <p:cond delay="0"/>
+                                  </p:stCondLst>
+                                  <p:childTnLst>
+                                    <p:set>
+                                      <p:cBhvr>
+                                        <p:cTn id="17" dur="1" fill="hold">
+                                          <p:stCondLst>
+                                            <p:cond delay="0"/>
+                                          </p:stCondLst>
+                                        </p:cTn>
+                                        <p:tgtEl>
+                                          <p:spTgt spid="23"/>
+                                        </p:tgtEl>
+                                        <p:attrNameLst>
+                                          <p:attrName>style.visibility</p:attrName>
+                                        </p:attrNameLst>
+                                      </p:cBhvr>
+                                      <p:to>
+                                        <p:strVal val="visible"/>
+                                      </p:to>
+                                    </p:set>
+                                    <p:animEffect transition="in" filter="fade">
+                                      <p:cBhvr>
+                                        <p:cTn id="18" dur="500"/>
+                                        <p:tgtEl>
+                                          <p:spTgt spid="23"/>
+                                        </p:tgtEl>
+                                      </p:cBhvr>
+                                    </p:animEffect>
+                                  </p:childTnLst>
+                                </p:cTn>
+                              </p:par>
+                              <p:par>
+                                <p:cTn id="19" presetID="10" presetClass="exit" presetSubtype="0" fill="hold" grpId="1" nodeType="withEffect">
+                                  <p:stCondLst>
+                                    <p:cond delay="0"/>
+                                  </p:stCondLst>
+                                  <p:childTnLst>
+                                    <p:animEffect transition="out" filter="fade">
+                                      <p:cBhvr>
+                                        <p:cTn id="20" dur="500"/>
+                                        <p:tgtEl>
+                                          <p:spTgt spid="26"/>
+                                        </p:tgtEl>
+                                      </p:cBhvr>
+                                    </p:animEffect>
+                                    <p:set>
+                                      <p:cBhvr>
+                                        <p:cTn id="21" dur="1" fill="hold">
+                                          <p:stCondLst>
+                                            <p:cond delay="499"/>
+                                          </p:stCondLst>
+                                        </p:cTn>
+                                        <p:tgtEl>
+                                          <p:spTgt spid="26"/>
+                                        </p:tgtEl>
+                                        <p:attrNameLst>
+                                          <p:attrName>style.visibility</p:attrName>
+                                        </p:attrNameLst>
+                                      </p:cBhvr>
+                                      <p:to>
+                                        <p:strVal val="hidden"/>
+                                      </p:to>
+                                    </p:set>
+                                  </p:childTnLst>
+                                </p:cTn>
+                              </p:par>
+                            </p:childTnLst>
+                          </p:cTn>
+                        </p:par>
+                      </p:childTnLst>
+                    </p:cTn>
+                  </p:par>
+                </p:childTnLst>
+              </p:cTn>
+              <p:prevCondLst>
+                <p:cond evt="onPrev" delay="0">
+                  <p:tgtEl>
+                    <p:sldTgt/>
+                  </p:tgtEl>
+                </p:cond>
+              </p:prevCondLst>
+              <p:nextCondLst>
+                <p:cond evt="onNext" delay="0">
+                  <p:tgtEl>
+                    <p:sldTgt/>
+                  </p:tgtEl>
+                </p:cond>
+              </p:nextCondLst>
+            </p:seq>
+          </p:childTnLst>
+        </p:cTn>
+      </p:par>
+    </p:tnLst>
+    <p:bldLst>
+      <p:bldP spid="7" grpId="0" animBg="1"/>
+      <p:bldP spid="9" grpId="0" animBg="1"/>
+      <p:bldP spid="26" grpId="0" animBg="1"/>
+      <p:bldP spid="26" grpId="1" animBg="1"/>
+    </p:bldLst>
+  </p:timing>
+</p:sld>
+</file>
+
+<file path=ppt/slides/slide16.xml><?xml version="1.0" encoding="utf-8"?>
+<p:sld xmlns:a="http://schemas.openxmlformats.org/drawingml/2006/main" xmlns:r="http://schemas.openxmlformats.org/officeDocument/2006/relationships" xmlns:p="http://schemas.openxmlformats.org/presentationml/2006/main">
+  <p:cSld>
+    <p:spTree>
+      <p:nvGrpSpPr>
+        <p:cNvPr id="1" name=""/>
+        <p:cNvGrpSpPr/>
+        <p:nvPr/>
+      </p:nvGrpSpPr>
+      <p:grpSpPr>
+        <a:xfrm>
+          <a:off x="0" y="0"/>
+          <a:ext cx="0" cy="0"/>
+          <a:chOff x="0" y="0"/>
+          <a:chExt cx="0" cy="0"/>
+        </a:xfrm>
+      </p:grpSpPr>
+      <p:pic>
+        <p:nvPicPr>
+          <p:cNvPr id="9" name="Picture 8"/>
+          <p:cNvPicPr>
+            <a:picLocks noChangeAspect="1"/>
+          </p:cNvPicPr>
+          <p:nvPr/>
+        </p:nvPicPr>
+        <p:blipFill>
+          <a:blip r:embed="rId3">
+            <a:extLst>
+              <a:ext uri="{28A0092B-C50C-407E-A947-70E740481C1C}">
+                <a14:useLocalDpi xmlns:a14="http://schemas.microsoft.com/office/drawing/2010/main" val="0"/>
+              </a:ext>
+            </a:extLst>
+          </a:blip>
+          <a:stretch>
+            <a:fillRect/>
+          </a:stretch>
+        </p:blipFill>
+        <p:spPr>
+          <a:xfrm>
+            <a:off x="602450" y="1660285"/>
+            <a:ext cx="6876700" cy="3791110"/>
+          </a:xfrm>
+          <a:prstGeom prst="rect">
+            <a:avLst/>
+          </a:prstGeom>
+        </p:spPr>
+      </p:pic>
+      <p:pic>
+        <p:nvPicPr>
+          <p:cNvPr id="3" name="Picture 2"/>
+          <p:cNvPicPr>
+            <a:picLocks noChangeAspect="1"/>
+          </p:cNvPicPr>
+          <p:nvPr/>
+        </p:nvPicPr>
+        <p:blipFill>
+          <a:blip r:embed="rId4">
+            <a:extLst>
+              <a:ext uri="{28A0092B-C50C-407E-A947-70E740481C1C}">
+                <a14:useLocalDpi xmlns:a14="http://schemas.microsoft.com/office/drawing/2010/main" val="0"/>
+              </a:ext>
+            </a:extLst>
+          </a:blip>
+          <a:stretch>
+            <a:fillRect/>
+          </a:stretch>
+        </p:blipFill>
+        <p:spPr>
+          <a:xfrm>
+            <a:off x="6505216" y="2223085"/>
+            <a:ext cx="4210768" cy="4315827"/>
+          </a:xfrm>
+          <a:prstGeom prst="rect">
+            <a:avLst/>
+          </a:prstGeom>
+        </p:spPr>
+      </p:pic>
+      <p:sp>
+        <p:nvSpPr>
+          <p:cNvPr id="2" name="Title 1"/>
+          <p:cNvSpPr>
+            <a:spLocks noGrp="1"/>
+          </p:cNvSpPr>
+          <p:nvPr>
+            <p:ph type="title"/>
+          </p:nvPr>
+        </p:nvSpPr>
+        <p:spPr/>
+        <p:txBody>
+          <a:bodyPr/>
+          <a:lstStyle/>
+          <a:p>
+            <a:r>
+              <a:rPr lang="en-US" dirty="0" smtClean="0">
+                <a:solidFill>
+                  <a:srgbClr val="4C566A"/>
+                </a:solidFill>
+                <a:latin typeface="Red Hat Mono Medium" panose="02010309040201060303" pitchFamily="49" charset="0"/>
+                <a:ea typeface="Red Hat Mono Medium" panose="02010309040201060303" pitchFamily="49" charset="0"/>
+                <a:cs typeface="Red Hat Mono Medium" panose="02010309040201060303" pitchFamily="49" charset="0"/>
+              </a:rPr>
+              <a:t>Step 3: </a:t>
+            </a:r>
+            <a:r>
+              <a:rPr lang="en-US" dirty="0" smtClean="0">
+                <a:solidFill>
+                  <a:srgbClr val="4C566A"/>
+                </a:solidFill>
+                <a:latin typeface="Red Hat Mono Medium" panose="02010309040201060303" pitchFamily="49" charset="0"/>
+                <a:ea typeface="Red Hat Mono Medium" panose="02010309040201060303" pitchFamily="49" charset="0"/>
+                <a:cs typeface="Red Hat Mono Medium" panose="02010309040201060303" pitchFamily="49" charset="0"/>
+              </a:rPr>
+              <a:t>Commit (</a:t>
+            </a:r>
+            <a:r>
+              <a:rPr lang="en-US" dirty="0" err="1" smtClean="0">
+                <a:solidFill>
+                  <a:srgbClr val="4C566A"/>
+                </a:solidFill>
+                <a:latin typeface="Red Hat Mono Medium" panose="02010309040201060303" pitchFamily="49" charset="0"/>
+                <a:ea typeface="Red Hat Mono Medium" panose="02010309040201060303" pitchFamily="49" charset="0"/>
+                <a:cs typeface="Red Hat Mono Medium" panose="02010309040201060303" pitchFamily="49" charset="0"/>
+              </a:rPr>
+              <a:t>Rstudio</a:t>
+            </a:r>
+            <a:r>
+              <a:rPr lang="en-US" dirty="0" smtClean="0">
+                <a:solidFill>
+                  <a:srgbClr val="4C566A"/>
+                </a:solidFill>
+                <a:latin typeface="Red Hat Mono Medium" panose="02010309040201060303" pitchFamily="49" charset="0"/>
+                <a:ea typeface="Red Hat Mono Medium" panose="02010309040201060303" pitchFamily="49" charset="0"/>
+                <a:cs typeface="Red Hat Mono Medium" panose="02010309040201060303" pitchFamily="49" charset="0"/>
+              </a:rPr>
+              <a:t>)</a:t>
+            </a:r>
+            <a:endParaRPr lang="en-US" dirty="0">
+              <a:solidFill>
+                <a:srgbClr val="4C566A"/>
+              </a:solidFill>
+              <a:latin typeface="Red Hat Mono Medium" panose="02010309040201060303" pitchFamily="49" charset="0"/>
+              <a:ea typeface="Red Hat Mono Medium" panose="02010309040201060303" pitchFamily="49" charset="0"/>
+              <a:cs typeface="Red Hat Mono Medium" panose="02010309040201060303" pitchFamily="49" charset="0"/>
+            </a:endParaRPr>
+          </a:p>
+        </p:txBody>
+      </p:sp>
+      <p:sp>
+        <p:nvSpPr>
+          <p:cNvPr id="4" name="Slide Number Placeholder 3"/>
+          <p:cNvSpPr>
+            <a:spLocks noGrp="1"/>
+          </p:cNvSpPr>
+          <p:nvPr>
+            <p:ph type="sldNum" sz="quarter" idx="12"/>
+          </p:nvPr>
+        </p:nvSpPr>
+        <p:spPr/>
+        <p:txBody>
+          <a:bodyPr/>
+          <a:lstStyle/>
+          <a:p>
+            <a:fld id="{FE38431A-A5B3-46BF-BFD7-42EAB7F5F465}" type="slidenum">
+              <a:rPr lang="en-US" smtClean="0"/>
+              <a:pPr/>
+              <a:t>16</a:t>
+            </a:fld>
+            <a:endParaRPr lang="en-US"/>
+          </a:p>
+        </p:txBody>
+      </p:sp>
+      <p:sp>
+        <p:nvSpPr>
+          <p:cNvPr id="6" name="Rounded Rectangle 5"/>
+          <p:cNvSpPr/>
+          <p:nvPr/>
+        </p:nvSpPr>
+        <p:spPr>
+          <a:xfrm>
+            <a:off x="4916128" y="2228994"/>
+            <a:ext cx="481781" cy="295275"/>
+          </a:xfrm>
+          <a:prstGeom prst="roundRect">
+            <a:avLst/>
+          </a:prstGeom>
+          <a:noFill/>
+          <a:ln w="57150">
+            <a:solidFill>
+              <a:srgbClr val="B48EAD"/>
+            </a:solidFill>
+          </a:ln>
+        </p:spPr>
+        <p:style>
+          <a:lnRef idx="2">
+            <a:schemeClr val="accent1">
+              <a:shade val="50000"/>
+            </a:schemeClr>
+          </a:lnRef>
+          <a:fillRef idx="1">
+            <a:schemeClr val="accent1"/>
+          </a:fillRef>
+          <a:effectRef idx="0">
+            <a:schemeClr val="accent1"/>
+          </a:effectRef>
+          <a:fontRef idx="minor">
+            <a:schemeClr val="lt1"/>
+          </a:fontRef>
+        </p:style>
+        <p:txBody>
+          <a:bodyPr rtlCol="0" anchor="ctr"/>
+          <a:lstStyle/>
+          <a:p>
+            <a:pPr algn="ctr"/>
+            <a:endParaRPr lang="en-US"/>
+          </a:p>
+        </p:txBody>
+      </p:sp>
+      <p:sp>
+        <p:nvSpPr>
+          <p:cNvPr id="8" name="TextBox 7"/>
+          <p:cNvSpPr txBox="1"/>
+          <p:nvPr/>
+        </p:nvSpPr>
+        <p:spPr>
+          <a:xfrm>
+            <a:off x="1576384" y="5717593"/>
+            <a:ext cx="9039225" cy="408623"/>
+          </a:xfrm>
+          <a:prstGeom prst="roundRect">
+            <a:avLst/>
+          </a:prstGeom>
+          <a:solidFill>
+            <a:schemeClr val="bg1"/>
+          </a:solidFill>
+          <a:ln>
+            <a:solidFill>
+              <a:srgbClr val="ECEFF4"/>
+            </a:solidFill>
+          </a:ln>
+          <a:effectLst>
+            <a:outerShdw blurRad="50800" dist="38100" dir="5400000" algn="t" rotWithShape="0">
+              <a:srgbClr val="D8DEE9">
+                <a:alpha val="49000"/>
+              </a:srgbClr>
+            </a:outerShdw>
+          </a:effectLst>
+        </p:spPr>
+        <p:txBody>
+          <a:bodyPr wrap="square" rtlCol="0">
+            <a:spAutoFit/>
+          </a:bodyPr>
+          <a:lstStyle/>
+          <a:p>
+            <a:pPr algn="ctr"/>
+            <a:r>
+              <a:rPr lang="en-US" b="1" dirty="0" smtClean="0">
+                <a:solidFill>
+                  <a:srgbClr val="3B4252"/>
+                </a:solidFill>
+                <a:latin typeface="Red Hat Mono Light" panose="02010309040201060303" pitchFamily="49" charset="0"/>
+                <a:ea typeface="Red Hat Mono Light" panose="02010309040201060303" pitchFamily="49" charset="0"/>
+                <a:cs typeface="Red Hat Mono Light" panose="02010309040201060303" pitchFamily="49" charset="0"/>
+              </a:rPr>
+              <a:t>Commit</a:t>
+            </a:r>
+            <a:r>
+              <a:rPr lang="en-US" b="1" dirty="0" smtClean="0">
+                <a:solidFill>
+                  <a:srgbClr val="3B4252"/>
+                </a:solidFill>
+                <a:latin typeface="Red Hat Mono Light" panose="02010309040201060303" pitchFamily="49" charset="0"/>
+                <a:ea typeface="Red Hat Mono Light" panose="02010309040201060303" pitchFamily="49" charset="0"/>
+                <a:cs typeface="Red Hat Mono Light" panose="02010309040201060303" pitchFamily="49" charset="0"/>
+              </a:rPr>
+              <a:t>: Check </a:t>
+            </a:r>
+            <a:r>
+              <a:rPr lang="en-US" b="1" dirty="0" smtClean="0">
+                <a:solidFill>
+                  <a:srgbClr val="3B4252"/>
+                </a:solidFill>
+                <a:latin typeface="Red Hat Mono Light" panose="02010309040201060303" pitchFamily="49" charset="0"/>
+                <a:ea typeface="Red Hat Mono Light" panose="02010309040201060303" pitchFamily="49" charset="0"/>
+                <a:cs typeface="Red Hat Mono Light" panose="02010309040201060303" pitchFamily="49" charset="0"/>
+              </a:rPr>
+              <a:t>files</a:t>
+            </a:r>
+            <a:r>
+              <a:rPr lang="en-US" b="1" dirty="0" smtClean="0">
+                <a:solidFill>
+                  <a:srgbClr val="3B4252"/>
+                </a:solidFill>
+                <a:latin typeface="Red Hat Mono Light" panose="02010309040201060303" pitchFamily="49" charset="0"/>
+                <a:ea typeface="Red Hat Mono Light" panose="02010309040201060303" pitchFamily="49" charset="0"/>
+                <a:cs typeface="Red Hat Mono Light" panose="02010309040201060303" pitchFamily="49" charset="0"/>
+              </a:rPr>
+              <a:t> </a:t>
+            </a:r>
+            <a:r>
+              <a:rPr lang="en-US" b="1" dirty="0" smtClean="0">
+                <a:solidFill>
+                  <a:srgbClr val="3B4252"/>
+                </a:solidFill>
+                <a:latin typeface="Red Hat Mono Light" panose="02010309040201060303" pitchFamily="49" charset="0"/>
+                <a:ea typeface="Red Hat Mono Light" panose="02010309040201060303" pitchFamily="49" charset="0"/>
+                <a:cs typeface="Red Hat Mono Light" panose="02010309040201060303" pitchFamily="49" charset="0"/>
+                <a:sym typeface="Wingdings" panose="05000000000000000000" pitchFamily="2" charset="2"/>
+              </a:rPr>
+              <a:t> add commit </a:t>
+            </a:r>
+            <a:r>
+              <a:rPr lang="en-US" b="1" dirty="0" smtClean="0">
+                <a:solidFill>
+                  <a:srgbClr val="3B4252"/>
+                </a:solidFill>
+                <a:latin typeface="Red Hat Mono Light" panose="02010309040201060303" pitchFamily="49" charset="0"/>
+                <a:ea typeface="Red Hat Mono Light" panose="02010309040201060303" pitchFamily="49" charset="0"/>
+                <a:cs typeface="Red Hat Mono Light" panose="02010309040201060303" pitchFamily="49" charset="0"/>
+                <a:sym typeface="Wingdings" panose="05000000000000000000" pitchFamily="2" charset="2"/>
+              </a:rPr>
+              <a:t>message  </a:t>
+            </a:r>
+            <a:r>
+              <a:rPr lang="en-US" b="1" dirty="0" smtClean="0">
+                <a:solidFill>
+                  <a:srgbClr val="3B4252"/>
+                </a:solidFill>
+                <a:latin typeface="Red Hat Mono Light" panose="02010309040201060303" pitchFamily="49" charset="0"/>
+                <a:ea typeface="Red Hat Mono Light" panose="02010309040201060303" pitchFamily="49" charset="0"/>
+                <a:cs typeface="Red Hat Mono Light" panose="02010309040201060303" pitchFamily="49" charset="0"/>
+                <a:sym typeface="Wingdings" panose="05000000000000000000" pitchFamily="2" charset="2"/>
+              </a:rPr>
+              <a:t>commit</a:t>
+            </a:r>
+            <a:r>
+              <a:rPr lang="en-US" b="1" dirty="0">
+                <a:solidFill>
+                  <a:srgbClr val="3B4252"/>
+                </a:solidFill>
+                <a:latin typeface="Red Hat Mono Light" panose="02010309040201060303" pitchFamily="49" charset="0"/>
+                <a:ea typeface="Red Hat Mono Light" panose="02010309040201060303" pitchFamily="49" charset="0"/>
+                <a:cs typeface="Red Hat Mono Light" panose="02010309040201060303" pitchFamily="49" charset="0"/>
+                <a:sym typeface="Wingdings" panose="05000000000000000000" pitchFamily="2" charset="2"/>
+              </a:rPr>
+              <a:t> </a:t>
+            </a:r>
+            <a:r>
+              <a:rPr lang="en-US" b="1" dirty="0" smtClean="0">
+                <a:solidFill>
+                  <a:srgbClr val="3B4252"/>
+                </a:solidFill>
+                <a:latin typeface="Red Hat Mono Light" panose="02010309040201060303" pitchFamily="49" charset="0"/>
+                <a:ea typeface="Red Hat Mono Light" panose="02010309040201060303" pitchFamily="49" charset="0"/>
+                <a:cs typeface="Red Hat Mono Light" panose="02010309040201060303" pitchFamily="49" charset="0"/>
+                <a:sym typeface="Wingdings" panose="05000000000000000000" pitchFamily="2" charset="2"/>
+              </a:rPr>
+              <a:t>button</a:t>
+            </a:r>
+            <a:endParaRPr lang="en-US" b="1" dirty="0">
+              <a:solidFill>
+                <a:srgbClr val="3B4252"/>
+              </a:solidFill>
+              <a:latin typeface="Red Hat Mono Light" panose="02010309040201060303" pitchFamily="49" charset="0"/>
+              <a:ea typeface="Red Hat Mono Light" panose="02010309040201060303" pitchFamily="49" charset="0"/>
+              <a:cs typeface="Red Hat Mono Light" panose="02010309040201060303" pitchFamily="49" charset="0"/>
+            </a:endParaRPr>
+          </a:p>
+        </p:txBody>
+      </p:sp>
+      <p:sp>
+        <p:nvSpPr>
+          <p:cNvPr id="11" name="Oval 10"/>
+          <p:cNvSpPr/>
+          <p:nvPr/>
+        </p:nvSpPr>
+        <p:spPr>
+          <a:xfrm>
+            <a:off x="6505216" y="2580487"/>
+            <a:ext cx="295275" cy="295275"/>
+          </a:xfrm>
+          <a:prstGeom prst="ellipse">
+            <a:avLst/>
+          </a:prstGeom>
+          <a:noFill/>
+          <a:ln w="57150">
+            <a:solidFill>
+              <a:srgbClr val="B48EAD"/>
+            </a:solidFill>
+          </a:ln>
+        </p:spPr>
+        <p:style>
+          <a:lnRef idx="2">
+            <a:schemeClr val="accent1">
+              <a:shade val="50000"/>
+            </a:schemeClr>
+          </a:lnRef>
+          <a:fillRef idx="1">
+            <a:schemeClr val="accent1"/>
+          </a:fillRef>
+          <a:effectRef idx="0">
+            <a:schemeClr val="accent1"/>
+          </a:effectRef>
+          <a:fontRef idx="minor">
+            <a:schemeClr val="lt1"/>
+          </a:fontRef>
+        </p:style>
+        <p:txBody>
+          <a:bodyPr rtlCol="0" anchor="ctr"/>
+          <a:lstStyle/>
+          <a:p>
+            <a:pPr algn="ctr"/>
+            <a:endParaRPr lang="en-US"/>
+          </a:p>
+        </p:txBody>
+      </p:sp>
+      <p:sp>
+        <p:nvSpPr>
+          <p:cNvPr id="12" name="Rounded Rectangle 11"/>
+          <p:cNvSpPr/>
+          <p:nvPr/>
+        </p:nvSpPr>
+        <p:spPr>
+          <a:xfrm>
+            <a:off x="10234203" y="3574911"/>
+            <a:ext cx="481781" cy="295275"/>
+          </a:xfrm>
+          <a:prstGeom prst="roundRect">
+            <a:avLst/>
+          </a:prstGeom>
+          <a:noFill/>
+          <a:ln w="57150">
+            <a:solidFill>
+              <a:srgbClr val="B48EAD"/>
+            </a:solidFill>
+          </a:ln>
+        </p:spPr>
+        <p:style>
+          <a:lnRef idx="2">
+            <a:schemeClr val="accent1">
+              <a:shade val="50000"/>
+            </a:schemeClr>
+          </a:lnRef>
+          <a:fillRef idx="1">
+            <a:schemeClr val="accent1"/>
+          </a:fillRef>
+          <a:effectRef idx="0">
+            <a:schemeClr val="accent1"/>
+          </a:effectRef>
+          <a:fontRef idx="minor">
+            <a:schemeClr val="lt1"/>
+          </a:fontRef>
+        </p:style>
+        <p:txBody>
+          <a:bodyPr rtlCol="0" anchor="ctr"/>
+          <a:lstStyle/>
+          <a:p>
+            <a:pPr algn="ctr"/>
+            <a:endParaRPr lang="en-US"/>
+          </a:p>
+        </p:txBody>
+      </p:sp>
+    </p:spTree>
+    <p:extLst>
+      <p:ext uri="{BB962C8B-B14F-4D97-AF65-F5344CB8AC3E}">
+        <p14:creationId xmlns:p14="http://schemas.microsoft.com/office/powerpoint/2010/main" val="1159073022"/>
+      </p:ext>
+    </p:extLst>
+  </p:cSld>
+  <p:clrMapOvr>
+    <a:masterClrMapping/>
+  </p:clrMapOvr>
+  <mc:AlternateContent xmlns:mc="http://schemas.openxmlformats.org/markup-compatibility/2006" xmlns:p14="http://schemas.microsoft.com/office/powerpoint/2010/main">
+    <mc:Choice Requires="p14">
+      <p:transition p14:dur="0"/>
+    </mc:Choice>
+    <mc:Fallback xmlns="">
+      <p:transition/>
+    </mc:Fallback>
+  </mc:AlternateContent>
+  <p:timing>
+    <p:tnLst>
+      <p:par>
+        <p:cTn id="1" dur="indefinite" restart="never" nodeType="tmRoot">
+          <p:childTnLst>
+            <p:seq concurrent="1" nextAc="seek">
+              <p:cTn id="2" dur="indefinite" nodeType="mainSeq">
+                <p:childTnLst>
+                  <p:par>
+                    <p:cTn id="3" fill="hold">
+                      <p:stCondLst>
+                        <p:cond delay="indefinite"/>
+                      </p:stCondLst>
+                      <p:childTnLst>
+                        <p:par>
+                          <p:cTn id="4" fill="hold">
+                            <p:stCondLst>
+                              <p:cond delay="0"/>
+                            </p:stCondLst>
+                            <p:childTnLst>
+                              <p:par>
+                                <p:cTn id="5" presetID="10" presetClass="entr" presetSubtype="0" fill="hold" grpId="0" nodeType="clickEffect">
+                                  <p:stCondLst>
+                                    <p:cond delay="0"/>
+                                  </p:stCondLst>
+                                  <p:childTnLst>
+                                    <p:set>
+                                      <p:cBhvr>
+                                        <p:cTn id="6" dur="1" fill="hold">
+                                          <p:stCondLst>
+                                            <p:cond delay="0"/>
+                                          </p:stCondLst>
+                                        </p:cTn>
+                                        <p:tgtEl>
+                                          <p:spTgt spid="6"/>
+                                        </p:tgtEl>
+                                        <p:attrNameLst>
+                                          <p:attrName>style.visibility</p:attrName>
+                                        </p:attrNameLst>
+                                      </p:cBhvr>
+                                      <p:to>
+                                        <p:strVal val="visible"/>
+                                      </p:to>
+                                    </p:set>
+                                    <p:animEffect transition="in" filter="fade">
+                                      <p:cBhvr>
+                                        <p:cTn id="7" dur="500"/>
+                                        <p:tgtEl>
+                                          <p:spTgt spid="6"/>
+                                        </p:tgtEl>
+                                      </p:cBhvr>
+                                    </p:animEffect>
+                                  </p:childTnLst>
+                                </p:cTn>
+                              </p:par>
+                            </p:childTnLst>
+                          </p:cTn>
+                        </p:par>
+                      </p:childTnLst>
+                    </p:cTn>
+                  </p:par>
+                  <p:par>
+                    <p:cTn id="8" fill="hold">
+                      <p:stCondLst>
+                        <p:cond delay="indefinite"/>
+                      </p:stCondLst>
+                      <p:childTnLst>
+                        <p:par>
+                          <p:cTn id="9" fill="hold">
+                            <p:stCondLst>
+                              <p:cond delay="0"/>
+                            </p:stCondLst>
+                            <p:childTnLst>
+                              <p:par>
+                                <p:cTn id="10" presetID="10" presetClass="entr" presetSubtype="0" fill="hold" grpId="0" nodeType="clickEffect">
+                                  <p:stCondLst>
+                                    <p:cond delay="0"/>
+                                  </p:stCondLst>
+                                  <p:childTnLst>
+                                    <p:set>
+                                      <p:cBhvr>
+                                        <p:cTn id="11" dur="1" fill="hold">
+                                          <p:stCondLst>
+                                            <p:cond delay="0"/>
+                                          </p:stCondLst>
+                                        </p:cTn>
+                                        <p:tgtEl>
+                                          <p:spTgt spid="8"/>
+                                        </p:tgtEl>
+                                        <p:attrNameLst>
+                                          <p:attrName>style.visibility</p:attrName>
+                                        </p:attrNameLst>
+                                      </p:cBhvr>
+                                      <p:to>
+                                        <p:strVal val="visible"/>
+                                      </p:to>
+                                    </p:set>
+                                    <p:animEffect transition="in" filter="fade">
+                                      <p:cBhvr>
+                                        <p:cTn id="12" dur="500"/>
+                                        <p:tgtEl>
+                                          <p:spTgt spid="8"/>
+                                        </p:tgtEl>
+                                      </p:cBhvr>
+                                    </p:animEffect>
+                                  </p:childTnLst>
+                                </p:cTn>
+                              </p:par>
+                              <p:par>
+                                <p:cTn id="13" presetID="10" presetClass="entr" presetSubtype="0" fill="hold" grpId="0" nodeType="withEffect">
+                                  <p:stCondLst>
+                                    <p:cond delay="0"/>
+                                  </p:stCondLst>
+                                  <p:childTnLst>
+                                    <p:set>
+                                      <p:cBhvr>
+                                        <p:cTn id="14" dur="1" fill="hold">
+                                          <p:stCondLst>
+                                            <p:cond delay="0"/>
+                                          </p:stCondLst>
+                                        </p:cTn>
+                                        <p:tgtEl>
+                                          <p:spTgt spid="11"/>
+                                        </p:tgtEl>
+                                        <p:attrNameLst>
+                                          <p:attrName>style.visibility</p:attrName>
+                                        </p:attrNameLst>
+                                      </p:cBhvr>
+                                      <p:to>
+                                        <p:strVal val="visible"/>
+                                      </p:to>
+                                    </p:set>
+                                    <p:animEffect transition="in" filter="fade">
+                                      <p:cBhvr>
+                                        <p:cTn id="15" dur="500"/>
+                                        <p:tgtEl>
+                                          <p:spTgt spid="11"/>
+                                        </p:tgtEl>
+                                      </p:cBhvr>
+                                    </p:animEffect>
+                                  </p:childTnLst>
+                                </p:cTn>
+                              </p:par>
+                            </p:childTnLst>
+                          </p:cTn>
+                        </p:par>
+                      </p:childTnLst>
+                    </p:cTn>
+                  </p:par>
+                  <p:par>
+                    <p:cTn id="16" fill="hold">
+                      <p:stCondLst>
+                        <p:cond delay="indefinite"/>
+                      </p:stCondLst>
+                      <p:childTnLst>
+                        <p:par>
+                          <p:cTn id="17" fill="hold">
+                            <p:stCondLst>
+                              <p:cond delay="0"/>
+                            </p:stCondLst>
+                            <p:childTnLst>
+                              <p:par>
+                                <p:cTn id="18" presetID="10" presetClass="entr" presetSubtype="0" fill="hold" grpId="0" nodeType="clickEffect">
+                                  <p:stCondLst>
+                                    <p:cond delay="0"/>
+                                  </p:stCondLst>
+                                  <p:childTnLst>
+                                    <p:set>
+                                      <p:cBhvr>
+                                        <p:cTn id="19" dur="1" fill="hold">
+                                          <p:stCondLst>
+                                            <p:cond delay="0"/>
+                                          </p:stCondLst>
+                                        </p:cTn>
+                                        <p:tgtEl>
+                                          <p:spTgt spid="12"/>
+                                        </p:tgtEl>
+                                        <p:attrNameLst>
+                                          <p:attrName>style.visibility</p:attrName>
+                                        </p:attrNameLst>
+                                      </p:cBhvr>
+                                      <p:to>
+                                        <p:strVal val="visible"/>
+                                      </p:to>
+                                    </p:set>
+                                    <p:animEffect transition="in" filter="fade">
+                                      <p:cBhvr>
+                                        <p:cTn id="20" dur="500"/>
+                                        <p:tgtEl>
+                                          <p:spTgt spid="12"/>
+                                        </p:tgtEl>
+                                      </p:cBhvr>
+                                    </p:animEffect>
+                                  </p:childTnLst>
+                                </p:cTn>
+                              </p:par>
+                            </p:childTnLst>
+                          </p:cTn>
+                        </p:par>
+                      </p:childTnLst>
+                    </p:cTn>
+                  </p:par>
+                </p:childTnLst>
+              </p:cTn>
+              <p:prevCondLst>
+                <p:cond evt="onPrev" delay="0">
+                  <p:tgtEl>
+                    <p:sldTgt/>
+                  </p:tgtEl>
+                </p:cond>
+              </p:prevCondLst>
+              <p:nextCondLst>
+                <p:cond evt="onNext" delay="0">
+                  <p:tgtEl>
+                    <p:sldTgt/>
+                  </p:tgtEl>
+                </p:cond>
+              </p:nextCondLst>
+            </p:seq>
+          </p:childTnLst>
+        </p:cTn>
+      </p:par>
+    </p:tnLst>
+    <p:bldLst>
+      <p:bldP spid="6" grpId="0" animBg="1"/>
+      <p:bldP spid="8" grpId="0" animBg="1"/>
+      <p:bldP spid="11" grpId="0" animBg="1"/>
+      <p:bldP spid="12" grpId="0" animBg="1"/>
+    </p:bldLst>
+  </p:timing>
+</p:sld>
+</file>
+
+<file path=ppt/slides/slide17.xml><?xml version="1.0" encoding="utf-8"?>
+<p:sld xmlns:a="http://schemas.openxmlformats.org/drawingml/2006/main" xmlns:r="http://schemas.openxmlformats.org/officeDocument/2006/relationships" xmlns:p="http://schemas.openxmlformats.org/presentationml/2006/main">
+  <p:cSld>
+    <p:spTree>
+      <p:nvGrpSpPr>
+        <p:cNvPr id="1" name=""/>
+        <p:cNvGrpSpPr/>
+        <p:nvPr/>
+      </p:nvGrpSpPr>
+      <p:grpSpPr>
+        <a:xfrm>
+          <a:off x="0" y="0"/>
+          <a:ext cx="0" cy="0"/>
+          <a:chOff x="0" y="0"/>
+          <a:chExt cx="0" cy="0"/>
+        </a:xfrm>
+      </p:grpSpPr>
+      <p:pic>
+        <p:nvPicPr>
+          <p:cNvPr id="5" name="Picture 4"/>
+          <p:cNvPicPr>
+            <a:picLocks noChangeAspect="1"/>
+          </p:cNvPicPr>
+          <p:nvPr/>
+        </p:nvPicPr>
+        <p:blipFill>
+          <a:blip r:embed="rId3" cstate="print">
+            <a:extLst>
+              <a:ext uri="{28A0092B-C50C-407E-A947-70E740481C1C}">
+                <a14:useLocalDpi xmlns:a14="http://schemas.microsoft.com/office/drawing/2010/main" val="0"/>
+              </a:ext>
+            </a:extLst>
+          </a:blip>
+          <a:stretch>
+            <a:fillRect/>
+          </a:stretch>
+        </p:blipFill>
+        <p:spPr>
+          <a:xfrm>
+            <a:off x="2198860" y="1567984"/>
+            <a:ext cx="6590914" cy="3633557"/>
+          </a:xfrm>
+          <a:prstGeom prst="rect">
+            <a:avLst/>
+          </a:prstGeom>
+        </p:spPr>
+      </p:pic>
+      <p:sp>
+        <p:nvSpPr>
+          <p:cNvPr id="2" name="Title 1"/>
+          <p:cNvSpPr>
+            <a:spLocks noGrp="1"/>
+          </p:cNvSpPr>
+          <p:nvPr>
+            <p:ph type="title"/>
+          </p:nvPr>
+        </p:nvSpPr>
+        <p:spPr/>
+        <p:txBody>
+          <a:bodyPr/>
+          <a:lstStyle/>
+          <a:p>
+            <a:r>
+              <a:rPr lang="en-US" dirty="0" smtClean="0">
+                <a:solidFill>
+                  <a:srgbClr val="4C566A"/>
+                </a:solidFill>
+                <a:latin typeface="Red Hat Mono Medium" panose="02010309040201060303" pitchFamily="49" charset="0"/>
+                <a:ea typeface="Red Hat Mono Medium" panose="02010309040201060303" pitchFamily="49" charset="0"/>
+                <a:cs typeface="Red Hat Mono Medium" panose="02010309040201060303" pitchFamily="49" charset="0"/>
+              </a:rPr>
+              <a:t>Step 3: </a:t>
+            </a:r>
+            <a:r>
+              <a:rPr lang="en-US" dirty="0" smtClean="0">
+                <a:solidFill>
+                  <a:srgbClr val="4C566A"/>
+                </a:solidFill>
+                <a:latin typeface="Red Hat Mono Medium" panose="02010309040201060303" pitchFamily="49" charset="0"/>
+                <a:ea typeface="Red Hat Mono Medium" panose="02010309040201060303" pitchFamily="49" charset="0"/>
+                <a:cs typeface="Red Hat Mono Medium" panose="02010309040201060303" pitchFamily="49" charset="0"/>
+              </a:rPr>
+              <a:t>Push Changes (</a:t>
+            </a:r>
+            <a:r>
+              <a:rPr lang="en-US" dirty="0" err="1" smtClean="0">
+                <a:solidFill>
+                  <a:srgbClr val="4C566A"/>
+                </a:solidFill>
+                <a:latin typeface="Red Hat Mono Medium" panose="02010309040201060303" pitchFamily="49" charset="0"/>
+                <a:ea typeface="Red Hat Mono Medium" panose="02010309040201060303" pitchFamily="49" charset="0"/>
+                <a:cs typeface="Red Hat Mono Medium" panose="02010309040201060303" pitchFamily="49" charset="0"/>
+              </a:rPr>
+              <a:t>Rstudio</a:t>
+            </a:r>
+            <a:r>
+              <a:rPr lang="en-US" dirty="0" smtClean="0">
+                <a:solidFill>
+                  <a:srgbClr val="4C566A"/>
+                </a:solidFill>
+                <a:latin typeface="Red Hat Mono Medium" panose="02010309040201060303" pitchFamily="49" charset="0"/>
+                <a:ea typeface="Red Hat Mono Medium" panose="02010309040201060303" pitchFamily="49" charset="0"/>
+                <a:cs typeface="Red Hat Mono Medium" panose="02010309040201060303" pitchFamily="49" charset="0"/>
+              </a:rPr>
+              <a:t>)</a:t>
+            </a:r>
+            <a:endParaRPr lang="en-US" dirty="0">
+              <a:solidFill>
+                <a:srgbClr val="4C566A"/>
+              </a:solidFill>
+              <a:latin typeface="Red Hat Mono Medium" panose="02010309040201060303" pitchFamily="49" charset="0"/>
+              <a:ea typeface="Red Hat Mono Medium" panose="02010309040201060303" pitchFamily="49" charset="0"/>
+              <a:cs typeface="Red Hat Mono Medium" panose="02010309040201060303" pitchFamily="49" charset="0"/>
+            </a:endParaRPr>
+          </a:p>
+        </p:txBody>
+      </p:sp>
+      <p:sp>
+        <p:nvSpPr>
+          <p:cNvPr id="4" name="Slide Number Placeholder 3"/>
+          <p:cNvSpPr>
+            <a:spLocks noGrp="1"/>
+          </p:cNvSpPr>
+          <p:nvPr>
+            <p:ph type="sldNum" sz="quarter" idx="12"/>
+          </p:nvPr>
+        </p:nvSpPr>
+        <p:spPr/>
+        <p:txBody>
+          <a:bodyPr/>
+          <a:lstStyle/>
+          <a:p>
+            <a:fld id="{FE38431A-A5B3-46BF-BFD7-42EAB7F5F465}" type="slidenum">
+              <a:rPr lang="en-US" smtClean="0"/>
+              <a:pPr/>
+              <a:t>17</a:t>
+            </a:fld>
+            <a:endParaRPr lang="en-US"/>
+          </a:p>
+        </p:txBody>
+      </p:sp>
+      <p:sp>
+        <p:nvSpPr>
+          <p:cNvPr id="6" name="Rounded Rectangle 5"/>
+          <p:cNvSpPr/>
+          <p:nvPr/>
+        </p:nvSpPr>
+        <p:spPr>
+          <a:xfrm>
+            <a:off x="6156960" y="2106765"/>
+            <a:ext cx="426720" cy="340178"/>
+          </a:xfrm>
+          <a:prstGeom prst="roundRect">
+            <a:avLst/>
+          </a:prstGeom>
+          <a:noFill/>
+          <a:ln w="57150">
+            <a:solidFill>
+              <a:srgbClr val="B48EAD"/>
+            </a:solidFill>
+          </a:ln>
+        </p:spPr>
+        <p:style>
+          <a:lnRef idx="2">
+            <a:schemeClr val="accent1">
+              <a:shade val="50000"/>
+            </a:schemeClr>
+          </a:lnRef>
+          <a:fillRef idx="1">
+            <a:schemeClr val="accent1"/>
+          </a:fillRef>
+          <a:effectRef idx="0">
+            <a:schemeClr val="accent1"/>
+          </a:effectRef>
+          <a:fontRef idx="minor">
+            <a:schemeClr val="lt1"/>
+          </a:fontRef>
+        </p:style>
+        <p:txBody>
+          <a:bodyPr rtlCol="0" anchor="ctr"/>
+          <a:lstStyle/>
+          <a:p>
+            <a:pPr algn="ctr"/>
+            <a:endParaRPr lang="en-US"/>
+          </a:p>
+        </p:txBody>
+      </p:sp>
+      <p:sp>
+        <p:nvSpPr>
+          <p:cNvPr id="8" name="TextBox 7"/>
+          <p:cNvSpPr txBox="1"/>
+          <p:nvPr/>
+        </p:nvSpPr>
+        <p:spPr>
+          <a:xfrm>
+            <a:off x="1576384" y="5717593"/>
+            <a:ext cx="9039225" cy="408623"/>
+          </a:xfrm>
+          <a:prstGeom prst="roundRect">
+            <a:avLst/>
+          </a:prstGeom>
+          <a:solidFill>
+            <a:schemeClr val="bg1"/>
+          </a:solidFill>
+          <a:ln>
+            <a:solidFill>
+              <a:srgbClr val="ECEFF4"/>
+            </a:solidFill>
+          </a:ln>
+          <a:effectLst>
+            <a:outerShdw blurRad="50800" dist="38100" dir="5400000" algn="t" rotWithShape="0">
+              <a:srgbClr val="D8DEE9">
+                <a:alpha val="49000"/>
+              </a:srgbClr>
+            </a:outerShdw>
+          </a:effectLst>
+        </p:spPr>
+        <p:txBody>
+          <a:bodyPr wrap="square" rtlCol="0">
+            <a:spAutoFit/>
+          </a:bodyPr>
+          <a:lstStyle/>
+          <a:p>
+            <a:pPr algn="ctr"/>
+            <a:r>
+              <a:rPr lang="en-US" b="1" dirty="0" err="1" smtClean="0">
+                <a:solidFill>
+                  <a:srgbClr val="3B4252"/>
+                </a:solidFill>
+                <a:latin typeface="Red Hat Mono Light" panose="02010309040201060303" pitchFamily="49" charset="0"/>
+                <a:ea typeface="Red Hat Mono Light" panose="02010309040201060303" pitchFamily="49" charset="0"/>
+                <a:cs typeface="Red Hat Mono Light" panose="02010309040201060303" pitchFamily="49" charset="0"/>
+                <a:sym typeface="Wingdings" panose="05000000000000000000" pitchFamily="2" charset="2"/>
+              </a:rPr>
+              <a:t>Git</a:t>
+            </a:r>
+            <a:r>
+              <a:rPr lang="en-US" b="1" dirty="0" smtClean="0">
+                <a:solidFill>
+                  <a:srgbClr val="3B4252"/>
+                </a:solidFill>
+                <a:latin typeface="Red Hat Mono Light" panose="02010309040201060303" pitchFamily="49" charset="0"/>
+                <a:ea typeface="Red Hat Mono Light" panose="02010309040201060303" pitchFamily="49" charset="0"/>
+                <a:cs typeface="Red Hat Mono Light" panose="02010309040201060303" pitchFamily="49" charset="0"/>
+                <a:sym typeface="Wingdings" panose="05000000000000000000" pitchFamily="2" charset="2"/>
+              </a:rPr>
+              <a:t> pane-Push</a:t>
+            </a:r>
+            <a:r>
+              <a:rPr lang="en-US" b="1" dirty="0" smtClean="0">
+                <a:solidFill>
+                  <a:srgbClr val="3B4252"/>
+                </a:solidFill>
+                <a:latin typeface="Red Hat Mono Light" panose="02010309040201060303" pitchFamily="49" charset="0"/>
+                <a:ea typeface="Red Hat Mono Light" panose="02010309040201060303" pitchFamily="49" charset="0"/>
+                <a:cs typeface="Red Hat Mono Light" panose="02010309040201060303" pitchFamily="49" charset="0"/>
+                <a:sym typeface="Wingdings" panose="05000000000000000000" pitchFamily="2" charset="2"/>
+              </a:rPr>
+              <a:t>  push </a:t>
+            </a:r>
+            <a:r>
+              <a:rPr lang="en-US" b="1" dirty="0" smtClean="0">
+                <a:solidFill>
+                  <a:srgbClr val="3B4252"/>
+                </a:solidFill>
+                <a:latin typeface="Red Hat Mono Light" panose="02010309040201060303" pitchFamily="49" charset="0"/>
+                <a:ea typeface="Red Hat Mono Light" panose="02010309040201060303" pitchFamily="49" charset="0"/>
+                <a:cs typeface="Red Hat Mono Light" panose="02010309040201060303" pitchFamily="49" charset="0"/>
+                <a:sym typeface="Wingdings" panose="05000000000000000000" pitchFamily="2" charset="2"/>
+              </a:rPr>
+              <a:t>changes to repo</a:t>
+            </a:r>
+            <a:endParaRPr lang="en-US" b="1" dirty="0">
+              <a:solidFill>
+                <a:srgbClr val="3B4252"/>
+              </a:solidFill>
+              <a:latin typeface="Red Hat Mono Light" panose="02010309040201060303" pitchFamily="49" charset="0"/>
+              <a:ea typeface="Red Hat Mono Light" panose="02010309040201060303" pitchFamily="49" charset="0"/>
+              <a:cs typeface="Red Hat Mono Light" panose="02010309040201060303" pitchFamily="49" charset="0"/>
+            </a:endParaRPr>
+          </a:p>
+        </p:txBody>
+      </p:sp>
+    </p:spTree>
+    <p:extLst>
+      <p:ext uri="{BB962C8B-B14F-4D97-AF65-F5344CB8AC3E}">
+        <p14:creationId xmlns:p14="http://schemas.microsoft.com/office/powerpoint/2010/main" val="3242215045"/>
+      </p:ext>
+    </p:extLst>
+  </p:cSld>
+  <p:clrMapOvr>
+    <a:masterClrMapping/>
+  </p:clrMapOvr>
+  <mc:AlternateContent xmlns:mc="http://schemas.openxmlformats.org/markup-compatibility/2006" xmlns:p14="http://schemas.microsoft.com/office/powerpoint/2010/main">
+    <mc:Choice Requires="p14">
+      <p:transition p14:dur="0"/>
+    </mc:Choice>
+    <mc:Fallback xmlns="">
+      <p:transition/>
+    </mc:Fallback>
+  </mc:AlternateContent>
+  <p:timing>
+    <p:tnLst>
+      <p:par>
+        <p:cTn id="1" dur="indefinite" restart="never" nodeType="tmRoot">
+          <p:childTnLst>
+            <p:seq concurrent="1" nextAc="seek">
+              <p:cTn id="2" dur="indefinite" nodeType="mainSeq">
+                <p:childTnLst>
+                  <p:par>
+                    <p:cTn id="3" fill="hold">
+                      <p:stCondLst>
+                        <p:cond delay="indefinite"/>
+                      </p:stCondLst>
+                      <p:childTnLst>
+                        <p:par>
+                          <p:cTn id="4" fill="hold">
+                            <p:stCondLst>
+                              <p:cond delay="0"/>
+                            </p:stCondLst>
+                            <p:childTnLst>
+                              <p:par>
+                                <p:cTn id="5" presetID="10" presetClass="entr" presetSubtype="0" fill="hold" grpId="0" nodeType="clickEffect">
+                                  <p:stCondLst>
+                                    <p:cond delay="0"/>
+                                  </p:stCondLst>
+                                  <p:childTnLst>
+                                    <p:set>
+                                      <p:cBhvr>
+                                        <p:cTn id="6" dur="1" fill="hold">
+                                          <p:stCondLst>
+                                            <p:cond delay="0"/>
+                                          </p:stCondLst>
+                                        </p:cTn>
+                                        <p:tgtEl>
+                                          <p:spTgt spid="6"/>
+                                        </p:tgtEl>
+                                        <p:attrNameLst>
+                                          <p:attrName>style.visibility</p:attrName>
+                                        </p:attrNameLst>
+                                      </p:cBhvr>
+                                      <p:to>
+                                        <p:strVal val="visible"/>
+                                      </p:to>
+                                    </p:set>
+                                    <p:animEffect transition="in" filter="fade">
+                                      <p:cBhvr>
+                                        <p:cTn id="7" dur="500"/>
+                                        <p:tgtEl>
+                                          <p:spTgt spid="6"/>
+                                        </p:tgtEl>
+                                      </p:cBhvr>
+                                    </p:animEffect>
+                                  </p:childTnLst>
+                                </p:cTn>
+                              </p:par>
+                            </p:childTnLst>
+                          </p:cTn>
+                        </p:par>
+                      </p:childTnLst>
+                    </p:cTn>
+                  </p:par>
+                  <p:par>
+                    <p:cTn id="8" fill="hold">
+                      <p:stCondLst>
+                        <p:cond delay="indefinite"/>
+                      </p:stCondLst>
+                      <p:childTnLst>
+                        <p:par>
+                          <p:cTn id="9" fill="hold">
+                            <p:stCondLst>
+                              <p:cond delay="0"/>
+                            </p:stCondLst>
+                            <p:childTnLst>
+                              <p:par>
+                                <p:cTn id="10" presetID="10" presetClass="entr" presetSubtype="0" fill="hold" grpId="0" nodeType="clickEffect">
+                                  <p:stCondLst>
+                                    <p:cond delay="0"/>
+                                  </p:stCondLst>
+                                  <p:childTnLst>
+                                    <p:set>
+                                      <p:cBhvr>
+                                        <p:cTn id="11" dur="1" fill="hold">
+                                          <p:stCondLst>
+                                            <p:cond delay="0"/>
+                                          </p:stCondLst>
+                                        </p:cTn>
+                                        <p:tgtEl>
+                                          <p:spTgt spid="8"/>
+                                        </p:tgtEl>
+                                        <p:attrNameLst>
+                                          <p:attrName>style.visibility</p:attrName>
+                                        </p:attrNameLst>
+                                      </p:cBhvr>
+                                      <p:to>
+                                        <p:strVal val="visible"/>
+                                      </p:to>
+                                    </p:set>
+                                    <p:animEffect transition="in" filter="fade">
+                                      <p:cBhvr>
+                                        <p:cTn id="12" dur="500"/>
+                                        <p:tgtEl>
+                                          <p:spTgt spid="8"/>
+                                        </p:tgtEl>
+                                      </p:cBhvr>
+                                    </p:animEffect>
+                                  </p:childTnLst>
+                                </p:cTn>
+                              </p:par>
+                            </p:childTnLst>
+                          </p:cTn>
+                        </p:par>
+                      </p:childTnLst>
+                    </p:cTn>
+                  </p:par>
+                </p:childTnLst>
+              </p:cTn>
+              <p:prevCondLst>
+                <p:cond evt="onPrev" delay="0">
+                  <p:tgtEl>
+                    <p:sldTgt/>
+                  </p:tgtEl>
+                </p:cond>
+              </p:prevCondLst>
+              <p:nextCondLst>
+                <p:cond evt="onNext" delay="0">
+                  <p:tgtEl>
+                    <p:sldTgt/>
+                  </p:tgtEl>
+                </p:cond>
+              </p:nextCondLst>
+            </p:seq>
+          </p:childTnLst>
+        </p:cTn>
+      </p:par>
+    </p:tnLst>
+    <p:bldLst>
+      <p:bldP spid="6" grpId="0" animBg="1"/>
+      <p:bldP spid="8" grpId="0" animBg="1"/>
+    </p:bldLst>
+  </p:timing>
+</p:sld>
+</file>
+
 <file path=ppt/slides/slide2.xml><?xml version="1.0" encoding="utf-8"?>
 <p:sld xmlns:a="http://schemas.openxmlformats.org/drawingml/2006/main" xmlns:r="http://schemas.openxmlformats.org/officeDocument/2006/relationships" xmlns:p="http://schemas.openxmlformats.org/presentationml/2006/main">
   <p:cSld>
@@ -9235,18 +11474,7 @@
                 <a:ea typeface="Red Hat Mono Light" panose="02010309040201060303" pitchFamily="49" charset="0"/>
                 <a:cs typeface="Red Hat Mono Light" panose="02010309040201060303" pitchFamily="49" charset="0"/>
               </a:rPr>
-              <a:t>Installed locally on </a:t>
-            </a:r>
-            <a:r>
-              <a:rPr lang="en-US" sz="2000" dirty="0" smtClean="0">
-                <a:solidFill>
-                  <a:srgbClr val="3B4252"/>
-                </a:solidFill>
-                <a:latin typeface="Red Hat Mono Light" panose="02010309040201060303" pitchFamily="49" charset="0"/>
-                <a:ea typeface="Red Hat Mono Light" panose="02010309040201060303" pitchFamily="49" charset="0"/>
-                <a:cs typeface="Red Hat Mono Light" panose="02010309040201060303" pitchFamily="49" charset="0"/>
-              </a:rPr>
-              <a:t>computer</a:t>
+              <a:t>Installed locally on computer</a:t>
             </a:r>
           </a:p>
           <a:p>
@@ -13165,13 +15393,7 @@
               <a:rPr lang="en-US" sz="2400" dirty="0" smtClean="0">
                 <a:latin typeface="Red Hat Mono Light" panose="02010309040201060303" pitchFamily="49" charset="0"/>
               </a:rPr>
-              <a:t>If committing multiple files, undo and commit </a:t>
-            </a:r>
-            <a:r>
-              <a:rPr lang="en-US" sz="2400" dirty="0" smtClean="0">
-                <a:latin typeface="Red Hat Mono Light" panose="02010309040201060303" pitchFamily="49" charset="0"/>
-              </a:rPr>
-              <a:t>individually</a:t>
+              <a:t>If committing multiple files, undo and commit individually</a:t>
             </a:r>
           </a:p>
           <a:p>
@@ -13189,9 +15411,6 @@
               </a:rPr>
               <a:t>For data analysis workflow, not R package</a:t>
             </a:r>
-            <a:endParaRPr lang="en-US" sz="1600" dirty="0" smtClean="0">
-              <a:latin typeface="Red Hat Mono Light" panose="02010309040201060303" pitchFamily="49" charset="0"/>
-            </a:endParaRPr>
           </a:p>
         </p:txBody>
       </p:sp>

</xml_diff>